<commit_message>
Updates to existing files. Add DMP example
Update to ppt and added data management plan example.
</commit_message>
<xml_diff>
--- a/2014-oss/day-03/DataMgmnt_v0.pptx
+++ b/2014-oss/day-03/DataMgmnt_v0.pptx
@@ -5,30 +5,31 @@
     <p:sldMasterId id="2147483648" r:id="rId1"/>
   </p:sldMasterIdLst>
   <p:notesMasterIdLst>
-    <p:notesMasterId r:id="rId23"/>
+    <p:notesMasterId r:id="rId24"/>
   </p:notesMasterIdLst>
   <p:sldIdLst>
     <p:sldId id="256" r:id="rId2"/>
     <p:sldId id="261" r:id="rId3"/>
-    <p:sldId id="262" r:id="rId4"/>
-    <p:sldId id="264" r:id="rId5"/>
-    <p:sldId id="269" r:id="rId6"/>
-    <p:sldId id="266" r:id="rId7"/>
-    <p:sldId id="271" r:id="rId8"/>
-    <p:sldId id="270" r:id="rId9"/>
-    <p:sldId id="279" r:id="rId10"/>
-    <p:sldId id="265" r:id="rId11"/>
-    <p:sldId id="280" r:id="rId12"/>
-    <p:sldId id="268" r:id="rId13"/>
-    <p:sldId id="263" r:id="rId14"/>
-    <p:sldId id="272" r:id="rId15"/>
-    <p:sldId id="273" r:id="rId16"/>
-    <p:sldId id="274" r:id="rId17"/>
-    <p:sldId id="275" r:id="rId18"/>
-    <p:sldId id="276" r:id="rId19"/>
-    <p:sldId id="277" r:id="rId20"/>
-    <p:sldId id="278" r:id="rId21"/>
-    <p:sldId id="267" r:id="rId22"/>
+    <p:sldId id="281" r:id="rId4"/>
+    <p:sldId id="262" r:id="rId5"/>
+    <p:sldId id="264" r:id="rId6"/>
+    <p:sldId id="269" r:id="rId7"/>
+    <p:sldId id="266" r:id="rId8"/>
+    <p:sldId id="271" r:id="rId9"/>
+    <p:sldId id="270" r:id="rId10"/>
+    <p:sldId id="279" r:id="rId11"/>
+    <p:sldId id="265" r:id="rId12"/>
+    <p:sldId id="280" r:id="rId13"/>
+    <p:sldId id="268" r:id="rId14"/>
+    <p:sldId id="263" r:id="rId15"/>
+    <p:sldId id="272" r:id="rId16"/>
+    <p:sldId id="273" r:id="rId17"/>
+    <p:sldId id="274" r:id="rId18"/>
+    <p:sldId id="275" r:id="rId19"/>
+    <p:sldId id="276" r:id="rId20"/>
+    <p:sldId id="277" r:id="rId21"/>
+    <p:sldId id="278" r:id="rId22"/>
+    <p:sldId id="267" r:id="rId23"/>
   </p:sldIdLst>
   <p:sldSz cx="9144000" cy="6858000" type="screen4x3"/>
   <p:notesSz cx="6858000" cy="9144000"/>
@@ -134,6 +135,7 @@
           <p14:sldIdLst>
             <p14:sldId id="256"/>
             <p14:sldId id="261"/>
+            <p14:sldId id="281"/>
           </p14:sldIdLst>
         </p14:section>
         <p14:section name="Vignettes" id="{D22729D6-9346-9B44-A88E-BBE75745A866}">
@@ -255,7 +257,7 @@
           <a:p>
             <a:fld id="{66FF3690-4E03-794E-97CE-30298CFBDEDB}" type="datetimeFigureOut">
               <a:rPr lang="en-US" smtClean="0"/>
-              <a:t>7/21/14</a:t>
+              <a:t>7/22/14</a:t>
             </a:fld>
             <a:endParaRPr lang="en-US"/>
           </a:p>
@@ -569,7 +571,7 @@
           <a:p>
             <a:r>
               <a:rPr lang="en-US" dirty="0" smtClean="0"/>
-              <a:t>80% of the work gets done in 20% of the time….</a:t>
+              <a:t>Shift your thinking</a:t>
             </a:r>
           </a:p>
           <a:p>
@@ -578,15 +580,11 @@
           <a:p>
             <a:r>
               <a:rPr lang="en-US" dirty="0" smtClean="0"/>
-              <a:t>How </a:t>
-            </a:r>
-            <a:r>
-              <a:rPr lang="en-US" dirty="0" smtClean="0"/>
-              <a:t>many of you spend 80 % on data gathering,</a:t>
+              <a:t>Not</a:t>
             </a:r>
             <a:r>
               <a:rPr lang="en-US" baseline="0" dirty="0" smtClean="0"/>
-              <a:t> data massage, cleanup, reformatting, etc.; 20% on actual analysis??</a:t>
+              <a:t> trying to turn you into a data manager</a:t>
             </a:r>
           </a:p>
           <a:p>
@@ -595,8 +593,9 @@
           <a:p>
             <a:r>
               <a:rPr lang="en-US" baseline="0" dirty="0" smtClean="0"/>
-              <a:t>Should be the other way around! 20% on finding, accessing, understanding, etc. and 80% on analysis…</a:t>
-            </a:r>
+              <a:t>You’ve gotten this far…</a:t>
+            </a:r>
+            <a:endParaRPr lang="en-US" dirty="0"/>
           </a:p>
         </p:txBody>
       </p:sp>
@@ -617,7 +616,7 @@
           <a:p>
             <a:fld id="{D143B355-512F-F24C-9108-A8F7347E9021}" type="slidenum">
               <a:rPr lang="en-US" smtClean="0"/>
-              <a:t>3</a:t>
+              <a:t>2</a:t>
             </a:fld>
             <a:endParaRPr lang="en-US"/>
           </a:p>
@@ -626,7 +625,7 @@
     </p:spTree>
     <p:extLst>
       <p:ext uri="{BB962C8B-B14F-4D97-AF65-F5344CB8AC3E}">
-        <p14:creationId xmlns:p14="http://schemas.microsoft.com/office/powerpoint/2010/main" val="1963974680"/>
+        <p14:creationId xmlns:p14="http://schemas.microsoft.com/office/powerpoint/2010/main" val="461624938"/>
       </p:ext>
     </p:extLst>
   </p:cSld>
@@ -682,7 +681,7 @@
           <a:p>
             <a:r>
               <a:rPr lang="en-US" dirty="0" smtClean="0"/>
-              <a:t>Bad data management planning with a lucky outcome</a:t>
+              <a:t>80% of the work gets done in 20% of the time….</a:t>
             </a:r>
           </a:p>
           <a:p>
@@ -691,13 +690,21 @@
           <a:p>
             <a:r>
               <a:rPr lang="en-US" dirty="0" smtClean="0"/>
-              <a:t>Data</a:t>
+              <a:t>How many of you spend 80 % on data gathering,</a:t>
             </a:r>
             <a:r>
               <a:rPr lang="en-US" baseline="0" dirty="0" smtClean="0"/>
-              <a:t> can be repurposed years later to enable new science…</a:t>
-            </a:r>
-            <a:endParaRPr lang="en-US" dirty="0"/>
+              <a:t> data massage, cleanup, reformatting, etc.; 20% on actual analysis??</a:t>
+            </a:r>
+          </a:p>
+          <a:p>
+            <a:endParaRPr lang="en-US" baseline="0" dirty="0" smtClean="0"/>
+          </a:p>
+          <a:p>
+            <a:r>
+              <a:rPr lang="en-US" baseline="0" dirty="0" smtClean="0"/>
+              <a:t>Should be the other way around! 20% on finding, accessing, understanding, etc. and 80% on analysis…</a:t>
+            </a:r>
           </a:p>
         </p:txBody>
       </p:sp>
@@ -718,7 +725,7 @@
           <a:p>
             <a:fld id="{D143B355-512F-F24C-9108-A8F7347E9021}" type="slidenum">
               <a:rPr lang="en-US" smtClean="0"/>
-              <a:t>5</a:t>
+              <a:t>4</a:t>
             </a:fld>
             <a:endParaRPr lang="en-US"/>
           </a:p>
@@ -727,7 +734,7 @@
     </p:spTree>
     <p:extLst>
       <p:ext uri="{BB962C8B-B14F-4D97-AF65-F5344CB8AC3E}">
-        <p14:creationId xmlns:p14="http://schemas.microsoft.com/office/powerpoint/2010/main" val="1858134524"/>
+        <p14:creationId xmlns:p14="http://schemas.microsoft.com/office/powerpoint/2010/main" val="1963974680"/>
       </p:ext>
     </p:extLst>
   </p:cSld>
@@ -783,11 +790,20 @@
           <a:p>
             <a:r>
               <a:rPr lang="en-US" dirty="0" smtClean="0"/>
-              <a:t>Don’t want your data to end up unusable</a:t>
+              <a:t>Bad data management planning with a lucky outcome</a:t>
+            </a:r>
+          </a:p>
+          <a:p>
+            <a:endParaRPr lang="en-US" dirty="0" smtClean="0"/>
+          </a:p>
+          <a:p>
+            <a:r>
+              <a:rPr lang="en-US" dirty="0" smtClean="0"/>
+              <a:t>Data</a:t>
             </a:r>
             <a:r>
               <a:rPr lang="en-US" baseline="0" dirty="0" smtClean="0"/>
-              <a:t> in a dark archive somewhere…</a:t>
+              <a:t> can be repurposed years later to enable new science…</a:t>
             </a:r>
             <a:endParaRPr lang="en-US" dirty="0"/>
           </a:p>
@@ -819,7 +835,7 @@
     </p:spTree>
     <p:extLst>
       <p:ext uri="{BB962C8B-B14F-4D97-AF65-F5344CB8AC3E}">
-        <p14:creationId xmlns:p14="http://schemas.microsoft.com/office/powerpoint/2010/main" val="2187165749"/>
+        <p14:creationId xmlns:p14="http://schemas.microsoft.com/office/powerpoint/2010/main" val="1858134524"/>
       </p:ext>
     </p:extLst>
   </p:cSld>
@@ -848,72 +864,72 @@
       </p:grpSpPr>
       <p:sp>
         <p:nvSpPr>
-          <p:cNvPr id="13313" name="Rectangle 1"/>
-          <p:cNvSpPr>
-            <a:spLocks noGrp="1" noRot="1" noChangeAspect="1" noChangeArrowheads="1"/>
+          <p:cNvPr id="2" name="Slide Image Placeholder 1"/>
+          <p:cNvSpPr>
+            <a:spLocks noGrp="1" noRot="1" noChangeAspect="1"/>
           </p:cNvSpPr>
           <p:nvPr>
             <p:ph type="sldImg"/>
           </p:nvPr>
         </p:nvSpPr>
-        <p:spPr>
-          <a:solidFill>
-            <a:srgbClr val="FFFFFF"/>
-          </a:solidFill>
-          <a:ln/>
-        </p:spPr>
-      </p:sp>
-      <p:sp>
-        <p:nvSpPr>
-          <p:cNvPr id="13314" name="Rectangle 2"/>
-          <p:cNvSpPr>
-            <a:spLocks noGrp="1" noChangeArrowheads="1"/>
+        <p:spPr/>
+      </p:sp>
+      <p:sp>
+        <p:nvSpPr>
+          <p:cNvPr id="3" name="Notes Placeholder 2"/>
+          <p:cNvSpPr>
+            <a:spLocks noGrp="1"/>
           </p:cNvSpPr>
           <p:nvPr>
             <p:ph type="body" idx="1"/>
           </p:nvPr>
         </p:nvSpPr>
-        <p:spPr>
-          <a:ln/>
-        </p:spPr>
+        <p:spPr/>
         <p:txBody>
           <a:bodyPr/>
           <a:lstStyle/>
           <a:p>
-            <a:pPr eaLnBrk="1" hangingPunct="1">
-              <a:defRPr/>
-            </a:pPr>
-            <a:r>
-              <a:rPr lang="en-US" smtClean="0">
-                <a:solidFill>
-                  <a:srgbClr val="000000"/>
-                </a:solidFill>
-                <a:latin typeface="Calibri" charset="0"/>
-                <a:cs typeface="Calibri" charset="0"/>
-                <a:sym typeface="Calibri" charset="0"/>
-              </a:rPr>
-              <a:t>In addition to the functional requirements and interAdditional drivers for guiding implementation.</a:t>
-            </a:r>
-          </a:p>
-          <a:p>
-            <a:pPr eaLnBrk="1" hangingPunct="1">
-              <a:defRPr/>
-            </a:pPr>
-            <a:r>
-              <a:rPr lang="en-US" smtClean="0">
-                <a:solidFill>
-                  <a:srgbClr val="000000"/>
-                </a:solidFill>
-                <a:latin typeface="Calibri" charset="0"/>
-                <a:cs typeface="Calibri" charset="0"/>
-                <a:sym typeface="Calibri" charset="0"/>
-              </a:rPr>
-              <a:t>- Scalable</a:t>
-            </a:r>
+            <a:r>
+              <a:rPr lang="en-US" dirty="0" smtClean="0"/>
+              <a:t>Don’t want your data to end up unusable</a:t>
+            </a:r>
+            <a:r>
+              <a:rPr lang="en-US" baseline="0" dirty="0" smtClean="0"/>
+              <a:t> in a dark archive somewhere…</a:t>
+            </a:r>
+            <a:endParaRPr lang="en-US" dirty="0"/>
+          </a:p>
+        </p:txBody>
+      </p:sp>
+      <p:sp>
+        <p:nvSpPr>
+          <p:cNvPr id="4" name="Slide Number Placeholder 3"/>
+          <p:cNvSpPr>
+            <a:spLocks noGrp="1"/>
+          </p:cNvSpPr>
+          <p:nvPr>
+            <p:ph type="sldNum" sz="quarter" idx="10"/>
+          </p:nvPr>
+        </p:nvSpPr>
+        <p:spPr/>
+        <p:txBody>
+          <a:bodyPr/>
+          <a:lstStyle/>
+          <a:p>
+            <a:fld id="{D143B355-512F-F24C-9108-A8F7347E9021}" type="slidenum">
+              <a:rPr lang="en-US" smtClean="0"/>
+              <a:t>7</a:t>
+            </a:fld>
+            <a:endParaRPr lang="en-US"/>
           </a:p>
         </p:txBody>
       </p:sp>
     </p:spTree>
+    <p:extLst>
+      <p:ext uri="{BB962C8B-B14F-4D97-AF65-F5344CB8AC3E}">
+        <p14:creationId xmlns:p14="http://schemas.microsoft.com/office/powerpoint/2010/main" val="2187165749"/>
+      </p:ext>
+    </p:extLst>
   </p:cSld>
   <p:clrMapOvr>
     <a:masterClrMapping/>
@@ -940,95 +956,72 @@
       </p:grpSpPr>
       <p:sp>
         <p:nvSpPr>
-          <p:cNvPr id="2" name="Slide Image Placeholder 1"/>
-          <p:cNvSpPr>
-            <a:spLocks noGrp="1" noRot="1" noChangeAspect="1"/>
+          <p:cNvPr id="13313" name="Rectangle 1"/>
+          <p:cNvSpPr>
+            <a:spLocks noGrp="1" noRot="1" noChangeAspect="1" noChangeArrowheads="1"/>
           </p:cNvSpPr>
           <p:nvPr>
             <p:ph type="sldImg"/>
           </p:nvPr>
         </p:nvSpPr>
-        <p:spPr/>
-      </p:sp>
-      <p:sp>
-        <p:nvSpPr>
-          <p:cNvPr id="3" name="Notes Placeholder 2"/>
-          <p:cNvSpPr>
-            <a:spLocks noGrp="1"/>
+        <p:spPr>
+          <a:solidFill>
+            <a:srgbClr val="FFFFFF"/>
+          </a:solidFill>
+          <a:ln/>
+        </p:spPr>
+      </p:sp>
+      <p:sp>
+        <p:nvSpPr>
+          <p:cNvPr id="13314" name="Rectangle 2"/>
+          <p:cNvSpPr>
+            <a:spLocks noGrp="1" noChangeArrowheads="1"/>
           </p:cNvSpPr>
           <p:nvPr>
             <p:ph type="body" idx="1"/>
           </p:nvPr>
         </p:nvSpPr>
-        <p:spPr/>
+        <p:spPr>
+          <a:ln/>
+        </p:spPr>
         <p:txBody>
           <a:bodyPr/>
           <a:lstStyle/>
           <a:p>
-            <a:r>
-              <a:rPr lang="en-US" dirty="0" smtClean="0"/>
-              <a:t>Integral</a:t>
-            </a:r>
-            <a:r>
-              <a:rPr lang="en-US" baseline="0" dirty="0" smtClean="0"/>
-              <a:t> to successful science</a:t>
-            </a:r>
-          </a:p>
-          <a:p>
-            <a:endParaRPr lang="en-US" baseline="0" dirty="0" smtClean="0"/>
-          </a:p>
-          <a:p>
-            <a:r>
-              <a:rPr lang="en-US" baseline="0" dirty="0" smtClean="0"/>
-              <a:t>Crucial for reproducibility</a:t>
-            </a:r>
-          </a:p>
-          <a:p>
-            <a:endParaRPr lang="en-US" baseline="0" dirty="0" smtClean="0"/>
-          </a:p>
-          <a:p>
-            <a:r>
-              <a:rPr lang="en-US" baseline="0" dirty="0" smtClean="0"/>
-              <a:t>You can get another publication/credit for new data created</a:t>
-            </a:r>
-          </a:p>
-          <a:p>
-            <a:endParaRPr lang="en-US" baseline="0" dirty="0" smtClean="0"/>
-          </a:p>
-          <a:p>
-            <a:endParaRPr lang="en-US" dirty="0"/>
-          </a:p>
-        </p:txBody>
-      </p:sp>
-      <p:sp>
-        <p:nvSpPr>
-          <p:cNvPr id="4" name="Slide Number Placeholder 3"/>
-          <p:cNvSpPr>
-            <a:spLocks noGrp="1"/>
-          </p:cNvSpPr>
-          <p:nvPr>
-            <p:ph type="sldNum" sz="quarter" idx="10"/>
-          </p:nvPr>
-        </p:nvSpPr>
-        <p:spPr/>
-        <p:txBody>
-          <a:bodyPr/>
-          <a:lstStyle/>
-          <a:p>
-            <a:fld id="{D143B355-512F-F24C-9108-A8F7347E9021}" type="slidenum">
-              <a:rPr lang="en-US" smtClean="0"/>
-              <a:t>11</a:t>
-            </a:fld>
-            <a:endParaRPr lang="en-US"/>
+            <a:pPr eaLnBrk="1" hangingPunct="1">
+              <a:defRPr/>
+            </a:pPr>
+            <a:r>
+              <a:rPr lang="en-US" smtClean="0">
+                <a:solidFill>
+                  <a:srgbClr val="000000"/>
+                </a:solidFill>
+                <a:latin typeface="Calibri" charset="0"/>
+                <a:cs typeface="Calibri" charset="0"/>
+                <a:sym typeface="Calibri" charset="0"/>
+              </a:rPr>
+              <a:t>In addition to the functional requirements and interAdditional drivers for guiding implementation.</a:t>
+            </a:r>
+          </a:p>
+          <a:p>
+            <a:pPr eaLnBrk="1" hangingPunct="1">
+              <a:defRPr/>
+            </a:pPr>
+            <a:r>
+              <a:rPr lang="en-US" smtClean="0">
+                <a:solidFill>
+                  <a:srgbClr val="000000"/>
+                </a:solidFill>
+                <a:latin typeface="Calibri" charset="0"/>
+                <a:cs typeface="Calibri" charset="0"/>
+                <a:sym typeface="Calibri" charset="0"/>
+              </a:rPr>
+              <a:t>- Scalable</a:t>
+            </a:r>
           </a:p>
         </p:txBody>
       </p:sp>
     </p:spTree>
-    <p:extLst>
-      <p:ext uri="{BB962C8B-B14F-4D97-AF65-F5344CB8AC3E}">
-        <p14:creationId xmlns:p14="http://schemas.microsoft.com/office/powerpoint/2010/main" val="2869918670"/>
-      </p:ext>
-    </p:extLst>
   </p:cSld>
   <p:clrMapOvr>
     <a:masterClrMapping/>
@@ -1082,11 +1075,29 @@
           <a:p>
             <a:r>
               <a:rPr lang="en-US" dirty="0" smtClean="0"/>
-              <a:t>Where data</a:t>
+              <a:t>Integral</a:t>
             </a:r>
             <a:r>
               <a:rPr lang="en-US" baseline="0" dirty="0" smtClean="0"/>
-              <a:t> management and physics collide</a:t>
+              <a:t> to successful science</a:t>
+            </a:r>
+          </a:p>
+          <a:p>
+            <a:endParaRPr lang="en-US" baseline="0" dirty="0" smtClean="0"/>
+          </a:p>
+          <a:p>
+            <a:r>
+              <a:rPr lang="en-US" baseline="0" dirty="0" smtClean="0"/>
+              <a:t>Crucial for reproducibility</a:t>
+            </a:r>
+          </a:p>
+          <a:p>
+            <a:endParaRPr lang="en-US" baseline="0" dirty="0" smtClean="0"/>
+          </a:p>
+          <a:p>
+            <a:r>
+              <a:rPr lang="en-US" baseline="0" dirty="0" smtClean="0"/>
+              <a:t>You can get another publication/credit for new data created</a:t>
             </a:r>
           </a:p>
           <a:p>
@@ -1114,7 +1125,7 @@
           <a:p>
             <a:fld id="{D143B355-512F-F24C-9108-A8F7347E9021}" type="slidenum">
               <a:rPr lang="en-US" smtClean="0"/>
-              <a:t>13</a:t>
+              <a:t>12</a:t>
             </a:fld>
             <a:endParaRPr lang="en-US"/>
           </a:p>
@@ -1123,7 +1134,7 @@
     </p:spTree>
     <p:extLst>
       <p:ext uri="{BB962C8B-B14F-4D97-AF65-F5344CB8AC3E}">
-        <p14:creationId xmlns:p14="http://schemas.microsoft.com/office/powerpoint/2010/main" val="1392389236"/>
+        <p14:creationId xmlns:p14="http://schemas.microsoft.com/office/powerpoint/2010/main" val="2869918670"/>
       </p:ext>
     </p:extLst>
   </p:cSld>
@@ -1177,6 +1188,19 @@
           <a:bodyPr/>
           <a:lstStyle/>
           <a:p>
+            <a:r>
+              <a:rPr lang="en-US" dirty="0" smtClean="0"/>
+              <a:t>Where data</a:t>
+            </a:r>
+            <a:r>
+              <a:rPr lang="en-US" baseline="0" dirty="0" smtClean="0"/>
+              <a:t> management and physics collide</a:t>
+            </a:r>
+          </a:p>
+          <a:p>
+            <a:endParaRPr lang="en-US" baseline="0" dirty="0" smtClean="0"/>
+          </a:p>
+          <a:p>
             <a:endParaRPr lang="en-US" dirty="0"/>
           </a:p>
         </p:txBody>
@@ -1198,7 +1222,91 @@
           <a:p>
             <a:fld id="{D143B355-512F-F24C-9108-A8F7347E9021}" type="slidenum">
               <a:rPr lang="en-US" smtClean="0"/>
-              <a:t>15</a:t>
+              <a:t>14</a:t>
+            </a:fld>
+            <a:endParaRPr lang="en-US"/>
+          </a:p>
+        </p:txBody>
+      </p:sp>
+    </p:spTree>
+    <p:extLst>
+      <p:ext uri="{BB962C8B-B14F-4D97-AF65-F5344CB8AC3E}">
+        <p14:creationId xmlns:p14="http://schemas.microsoft.com/office/powerpoint/2010/main" val="1392389236"/>
+      </p:ext>
+    </p:extLst>
+  </p:cSld>
+  <p:clrMapOvr>
+    <a:masterClrMapping/>
+  </p:clrMapOvr>
+</p:notes>
+</file>
+
+<file path=ppt/notesSlides/notesSlide8.xml><?xml version="1.0" encoding="utf-8"?>
+<p:notes xmlns:a="http://schemas.openxmlformats.org/drawingml/2006/main" xmlns:r="http://schemas.openxmlformats.org/officeDocument/2006/relationships" xmlns:p="http://schemas.openxmlformats.org/presentationml/2006/main">
+  <p:cSld>
+    <p:spTree>
+      <p:nvGrpSpPr>
+        <p:cNvPr id="1" name=""/>
+        <p:cNvGrpSpPr/>
+        <p:nvPr/>
+      </p:nvGrpSpPr>
+      <p:grpSpPr>
+        <a:xfrm>
+          <a:off x="0" y="0"/>
+          <a:ext cx="0" cy="0"/>
+          <a:chOff x="0" y="0"/>
+          <a:chExt cx="0" cy="0"/>
+        </a:xfrm>
+      </p:grpSpPr>
+      <p:sp>
+        <p:nvSpPr>
+          <p:cNvPr id="2" name="Slide Image Placeholder 1"/>
+          <p:cNvSpPr>
+            <a:spLocks noGrp="1" noRot="1" noChangeAspect="1"/>
+          </p:cNvSpPr>
+          <p:nvPr>
+            <p:ph type="sldImg"/>
+          </p:nvPr>
+        </p:nvSpPr>
+        <p:spPr/>
+      </p:sp>
+      <p:sp>
+        <p:nvSpPr>
+          <p:cNvPr id="3" name="Notes Placeholder 2"/>
+          <p:cNvSpPr>
+            <a:spLocks noGrp="1"/>
+          </p:cNvSpPr>
+          <p:nvPr>
+            <p:ph type="body" idx="1"/>
+          </p:nvPr>
+        </p:nvSpPr>
+        <p:spPr/>
+        <p:txBody>
+          <a:bodyPr/>
+          <a:lstStyle/>
+          <a:p>
+            <a:endParaRPr lang="en-US" dirty="0"/>
+          </a:p>
+        </p:txBody>
+      </p:sp>
+      <p:sp>
+        <p:nvSpPr>
+          <p:cNvPr id="4" name="Slide Number Placeholder 3"/>
+          <p:cNvSpPr>
+            <a:spLocks noGrp="1"/>
+          </p:cNvSpPr>
+          <p:nvPr>
+            <p:ph type="sldNum" sz="quarter" idx="10"/>
+          </p:nvPr>
+        </p:nvSpPr>
+        <p:spPr/>
+        <p:txBody>
+          <a:bodyPr/>
+          <a:lstStyle/>
+          <a:p>
+            <a:fld id="{D143B355-512F-F24C-9108-A8F7347E9021}" type="slidenum">
+              <a:rPr lang="en-US" smtClean="0"/>
+              <a:t>16</a:t>
             </a:fld>
             <a:endParaRPr lang="en-US"/>
           </a:p>
@@ -1398,7 +1506,7 @@
           <a:p>
             <a:fld id="{2DCB138D-9847-3742-9416-E70E96A9C61E}" type="datetimeFigureOut">
               <a:rPr lang="en-US" smtClean="0"/>
-              <a:t>7/21/14</a:t>
+              <a:t>7/22/14</a:t>
             </a:fld>
             <a:endParaRPr lang="en-US"/>
           </a:p>
@@ -1568,7 +1676,7 @@
           <a:p>
             <a:fld id="{2DCB138D-9847-3742-9416-E70E96A9C61E}" type="datetimeFigureOut">
               <a:rPr lang="en-US" smtClean="0"/>
-              <a:t>7/21/14</a:t>
+              <a:t>7/22/14</a:t>
             </a:fld>
             <a:endParaRPr lang="en-US"/>
           </a:p>
@@ -1748,7 +1856,7 @@
           <a:p>
             <a:fld id="{2DCB138D-9847-3742-9416-E70E96A9C61E}" type="datetimeFigureOut">
               <a:rPr lang="en-US" smtClean="0"/>
-              <a:t>7/21/14</a:t>
+              <a:t>7/22/14</a:t>
             </a:fld>
             <a:endParaRPr lang="en-US"/>
           </a:p>
@@ -1918,7 +2026,7 @@
           <a:p>
             <a:fld id="{2DCB138D-9847-3742-9416-E70E96A9C61E}" type="datetimeFigureOut">
               <a:rPr lang="en-US" smtClean="0"/>
-              <a:t>7/21/14</a:t>
+              <a:t>7/22/14</a:t>
             </a:fld>
             <a:endParaRPr lang="en-US"/>
           </a:p>
@@ -2164,7 +2272,7 @@
           <a:p>
             <a:fld id="{2DCB138D-9847-3742-9416-E70E96A9C61E}" type="datetimeFigureOut">
               <a:rPr lang="en-US" smtClean="0"/>
-              <a:t>7/21/14</a:t>
+              <a:t>7/22/14</a:t>
             </a:fld>
             <a:endParaRPr lang="en-US"/>
           </a:p>
@@ -2452,7 +2560,7 @@
           <a:p>
             <a:fld id="{2DCB138D-9847-3742-9416-E70E96A9C61E}" type="datetimeFigureOut">
               <a:rPr lang="en-US" smtClean="0"/>
-              <a:t>7/21/14</a:t>
+              <a:t>7/22/14</a:t>
             </a:fld>
             <a:endParaRPr lang="en-US"/>
           </a:p>
@@ -2874,7 +2982,7 @@
           <a:p>
             <a:fld id="{2DCB138D-9847-3742-9416-E70E96A9C61E}" type="datetimeFigureOut">
               <a:rPr lang="en-US" smtClean="0"/>
-              <a:t>7/21/14</a:t>
+              <a:t>7/22/14</a:t>
             </a:fld>
             <a:endParaRPr lang="en-US"/>
           </a:p>
@@ -2992,7 +3100,7 @@
           <a:p>
             <a:fld id="{2DCB138D-9847-3742-9416-E70E96A9C61E}" type="datetimeFigureOut">
               <a:rPr lang="en-US" smtClean="0"/>
-              <a:t>7/21/14</a:t>
+              <a:t>7/22/14</a:t>
             </a:fld>
             <a:endParaRPr lang="en-US"/>
           </a:p>
@@ -3087,7 +3195,7 @@
           <a:p>
             <a:fld id="{2DCB138D-9847-3742-9416-E70E96A9C61E}" type="datetimeFigureOut">
               <a:rPr lang="en-US" smtClean="0"/>
-              <a:t>7/21/14</a:t>
+              <a:t>7/22/14</a:t>
             </a:fld>
             <a:endParaRPr lang="en-US"/>
           </a:p>
@@ -3364,7 +3472,7 @@
           <a:p>
             <a:fld id="{2DCB138D-9847-3742-9416-E70E96A9C61E}" type="datetimeFigureOut">
               <a:rPr lang="en-US" smtClean="0"/>
-              <a:t>7/21/14</a:t>
+              <a:t>7/22/14</a:t>
             </a:fld>
             <a:endParaRPr lang="en-US"/>
           </a:p>
@@ -3617,7 +3725,7 @@
           <a:p>
             <a:fld id="{2DCB138D-9847-3742-9416-E70E96A9C61E}" type="datetimeFigureOut">
               <a:rPr lang="en-US" smtClean="0"/>
-              <a:t>7/21/14</a:t>
+              <a:t>7/22/14</a:t>
             </a:fld>
             <a:endParaRPr lang="en-US"/>
           </a:p>
@@ -3830,7 +3938,7 @@
           <a:p>
             <a:fld id="{2DCB138D-9847-3742-9416-E70E96A9C61E}" type="datetimeFigureOut">
               <a:rPr lang="en-US" smtClean="0"/>
-              <a:t>7/21/14</a:t>
+              <a:t>7/22/14</a:t>
             </a:fld>
             <a:endParaRPr lang="en-US"/>
           </a:p>
@@ -4222,11 +4330,7 @@
           <a:p>
             <a:r>
               <a:rPr lang="en-US" dirty="0" smtClean="0"/>
-              <a:t>Overview of Data </a:t>
-            </a:r>
-            <a:r>
-              <a:rPr lang="en-US" dirty="0" smtClean="0"/>
-              <a:t>Management</a:t>
+              <a:t>Overview of Data Management</a:t>
             </a:r>
             <a:endParaRPr lang="en-US" dirty="0"/>
           </a:p>
@@ -4306,9 +4410,336 @@
       </p:grpSpPr>
       <p:sp>
         <p:nvSpPr>
-          <p:cNvPr id="2" name="Title 1"/>
-          <p:cNvSpPr>
-            <a:spLocks noGrp="1"/>
+          <p:cNvPr id="12290" name="Text Box 2"/>
+          <p:cNvSpPr txBox="1">
+            <a:spLocks noChangeArrowheads="1"/>
+          </p:cNvSpPr>
+          <p:nvPr/>
+        </p:nvSpPr>
+        <p:spPr bwMode="auto">
+          <a:xfrm>
+            <a:off x="8442325" y="6467475"/>
+            <a:ext cx="244475" cy="254000"/>
+          </a:xfrm>
+          <a:prstGeom prst="rect">
+            <a:avLst/>
+          </a:prstGeom>
+          <a:noFill/>
+          <a:ln>
+            <a:noFill/>
+          </a:ln>
+          <a:effectLst/>
+          <a:extLst>
+            <a:ext uri="{909E8E84-426E-40dd-AFC4-6F175D3DCCD1}">
+              <a14:hiddenFill xmlns:a14="http://schemas.microsoft.com/office/drawing/2010/main">
+                <a:solidFill>
+                  <a:srgbClr val="FFFFFF"/>
+                </a:solidFill>
+              </a14:hiddenFill>
+            </a:ext>
+            <a:ext uri="{91240B29-F687-4f45-9708-019B960494DF}">
+              <a14:hiddenLine xmlns:a14="http://schemas.microsoft.com/office/drawing/2010/main" w="12700">
+                <a:solidFill>
+                  <a:schemeClr val="tx1"/>
+                </a:solidFill>
+                <a:miter lim="800000"/>
+                <a:headEnd/>
+                <a:tailEnd/>
+              </a14:hiddenLine>
+            </a:ext>
+            <a:ext uri="{AF507438-7753-43e0-B8FC-AC1667EBCBE1}">
+              <a14:hiddenEffects xmlns:a14="http://schemas.microsoft.com/office/drawing/2010/main">
+                <a:effectLst>
+                  <a:outerShdw blurRad="63500" dist="38099" dir="2700000" algn="ctr" rotWithShape="0">
+                    <a:srgbClr val="000000">
+                      <a:alpha val="74998"/>
+                    </a:srgbClr>
+                  </a:outerShdw>
+                </a:effectLst>
+              </a14:hiddenEffects>
+            </a:ext>
+          </a:extLst>
+        </p:spPr>
+        <p:txBody>
+          <a:bodyPr wrap="none" anchor="ctr"/>
+          <a:lstStyle>
+            <a:lvl1pPr algn="l">
+              <a:defRPr sz="1200">
+                <a:solidFill>
+                  <a:schemeClr val="tx1"/>
+                </a:solidFill>
+                <a:latin typeface="Gill Sans" charset="0"/>
+                <a:ea typeface="ＭＳ Ｐゴシック" charset="0"/>
+              </a:defRPr>
+            </a:lvl1pPr>
+            <a:lvl2pPr algn="l">
+              <a:defRPr sz="1200">
+                <a:solidFill>
+                  <a:schemeClr val="tx1"/>
+                </a:solidFill>
+                <a:latin typeface="Gill Sans" charset="0"/>
+                <a:ea typeface="ＭＳ Ｐゴシック" charset="0"/>
+              </a:defRPr>
+            </a:lvl2pPr>
+            <a:lvl3pPr algn="l">
+              <a:defRPr sz="1200">
+                <a:solidFill>
+                  <a:schemeClr val="tx1"/>
+                </a:solidFill>
+                <a:latin typeface="Gill Sans" charset="0"/>
+                <a:ea typeface="ＭＳ Ｐゴシック" charset="0"/>
+              </a:defRPr>
+            </a:lvl3pPr>
+            <a:lvl4pPr algn="l">
+              <a:defRPr sz="1200">
+                <a:solidFill>
+                  <a:schemeClr val="tx1"/>
+                </a:solidFill>
+                <a:latin typeface="Gill Sans" charset="0"/>
+                <a:ea typeface="ＭＳ Ｐゴシック" charset="0"/>
+              </a:defRPr>
+            </a:lvl4pPr>
+            <a:lvl5pPr algn="l">
+              <a:defRPr sz="1200">
+                <a:solidFill>
+                  <a:schemeClr val="tx1"/>
+                </a:solidFill>
+                <a:latin typeface="Gill Sans" charset="0"/>
+                <a:ea typeface="ＭＳ Ｐゴシック" charset="0"/>
+              </a:defRPr>
+            </a:lvl5pPr>
+            <a:lvl6pPr fontAlgn="base">
+              <a:spcBef>
+                <a:spcPct val="0"/>
+              </a:spcBef>
+              <a:spcAft>
+                <a:spcPct val="0"/>
+              </a:spcAft>
+              <a:defRPr sz="1200">
+                <a:solidFill>
+                  <a:schemeClr val="tx1"/>
+                </a:solidFill>
+                <a:latin typeface="Gill Sans" charset="0"/>
+                <a:ea typeface="ＭＳ Ｐゴシック" charset="0"/>
+              </a:defRPr>
+            </a:lvl6pPr>
+            <a:lvl7pPr fontAlgn="base">
+              <a:spcBef>
+                <a:spcPct val="0"/>
+              </a:spcBef>
+              <a:spcAft>
+                <a:spcPct val="0"/>
+              </a:spcAft>
+              <a:defRPr sz="1200">
+                <a:solidFill>
+                  <a:schemeClr val="tx1"/>
+                </a:solidFill>
+                <a:latin typeface="Gill Sans" charset="0"/>
+                <a:ea typeface="ＭＳ Ｐゴシック" charset="0"/>
+              </a:defRPr>
+            </a:lvl7pPr>
+            <a:lvl8pPr fontAlgn="base">
+              <a:spcBef>
+                <a:spcPct val="0"/>
+              </a:spcBef>
+              <a:spcAft>
+                <a:spcPct val="0"/>
+              </a:spcAft>
+              <a:defRPr sz="1200">
+                <a:solidFill>
+                  <a:schemeClr val="tx1"/>
+                </a:solidFill>
+                <a:latin typeface="Gill Sans" charset="0"/>
+                <a:ea typeface="ＭＳ Ｐゴシック" charset="0"/>
+              </a:defRPr>
+            </a:lvl8pPr>
+            <a:lvl9pPr fontAlgn="base">
+              <a:spcBef>
+                <a:spcPct val="0"/>
+              </a:spcBef>
+              <a:spcAft>
+                <a:spcPct val="0"/>
+              </a:spcAft>
+              <a:defRPr sz="1200">
+                <a:solidFill>
+                  <a:schemeClr val="tx1"/>
+                </a:solidFill>
+                <a:latin typeface="Gill Sans" charset="0"/>
+                <a:ea typeface="ＭＳ Ｐゴシック" charset="0"/>
+              </a:defRPr>
+            </a:lvl9pPr>
+          </a:lstStyle>
+          <a:p>
+            <a:pPr algn="r">
+              <a:defRPr/>
+            </a:pPr>
+            <a:fld id="{397BEB46-7E19-8345-B935-EE6BB9A0BF51}" type="slidenum">
+              <a:rPr lang="en-US" smtClean="0">
+                <a:solidFill>
+                  <a:srgbClr val="878787"/>
+                </a:solidFill>
+                <a:latin typeface="Calibri" charset="0"/>
+                <a:cs typeface="Calibri" charset="0"/>
+                <a:sym typeface="Calibri" charset="0"/>
+              </a:rPr>
+              <a:pPr algn="r">
+                <a:defRPr/>
+              </a:pPr>
+              <a:t>10</a:t>
+            </a:fld>
+            <a:endParaRPr lang="en-US" smtClean="0">
+              <a:solidFill>
+                <a:srgbClr val="878787"/>
+              </a:solidFill>
+              <a:latin typeface="Calibri" charset="0"/>
+              <a:cs typeface="Calibri" charset="0"/>
+              <a:sym typeface="Calibri" charset="0"/>
+            </a:endParaRPr>
+          </a:p>
+        </p:txBody>
+      </p:sp>
+      <p:sp>
+        <p:nvSpPr>
+          <p:cNvPr id="78851" name="Rectangle 3"/>
+          <p:cNvSpPr>
+            <a:spLocks/>
+          </p:cNvSpPr>
+          <p:nvPr/>
+        </p:nvSpPr>
+        <p:spPr bwMode="auto">
+          <a:xfrm>
+            <a:off x="7004050" y="6486525"/>
+            <a:ext cx="2146300" cy="365125"/>
+          </a:xfrm>
+          <a:prstGeom prst="rect">
+            <a:avLst/>
+          </a:prstGeom>
+          <a:noFill/>
+          <a:ln>
+            <a:noFill/>
+          </a:ln>
+          <a:extLst>
+            <a:ext uri="{909E8E84-426E-40dd-AFC4-6F175D3DCCD1}">
+              <a14:hiddenFill xmlns:a14="http://schemas.microsoft.com/office/drawing/2010/main">
+                <a:solidFill>
+                  <a:srgbClr val="FFFFFF"/>
+                </a:solidFill>
+              </a14:hiddenFill>
+            </a:ext>
+            <a:ext uri="{91240B29-F687-4f45-9708-019B960494DF}">
+              <a14:hiddenLine xmlns:a14="http://schemas.microsoft.com/office/drawing/2010/main" w="12700" cap="rnd">
+                <a:solidFill>
+                  <a:schemeClr val="tx1"/>
+                </a:solidFill>
+                <a:round/>
+                <a:headEnd/>
+                <a:tailEnd/>
+              </a14:hiddenLine>
+            </a:ext>
+          </a:extLst>
+        </p:spPr>
+        <p:txBody>
+          <a:bodyPr lIns="0" tIns="0" rIns="0" bIns="0"/>
+          <a:lstStyle/>
+          <a:p>
+            <a:endParaRPr lang="en-US"/>
+          </a:p>
+        </p:txBody>
+      </p:sp>
+      <p:sp>
+        <p:nvSpPr>
+          <p:cNvPr id="78852" name="Line 4"/>
+          <p:cNvSpPr>
+            <a:spLocks noChangeShapeType="1"/>
+          </p:cNvSpPr>
+          <p:nvPr/>
+        </p:nvSpPr>
+        <p:spPr bwMode="auto">
+          <a:xfrm>
+            <a:off x="457200" y="1166813"/>
+            <a:ext cx="8229600" cy="1587"/>
+          </a:xfrm>
+          <a:prstGeom prst="line">
+            <a:avLst/>
+          </a:prstGeom>
+          <a:noFill/>
+          <a:ln w="25400">
+            <a:solidFill>
+              <a:srgbClr val="186072"/>
+            </a:solidFill>
+            <a:round/>
+            <a:headEnd/>
+            <a:tailEnd/>
+          </a:ln>
+          <a:extLst>
+            <a:ext uri="{909E8E84-426E-40dd-AFC4-6F175D3DCCD1}">
+              <a14:hiddenFill xmlns:a14="http://schemas.microsoft.com/office/drawing/2010/main">
+                <a:noFill/>
+              </a14:hiddenFill>
+            </a:ext>
+          </a:extLst>
+        </p:spPr>
+        <p:txBody>
+          <a:bodyPr lIns="0" tIns="0" rIns="0" bIns="0"/>
+          <a:lstStyle/>
+          <a:p>
+            <a:endParaRPr lang="en-US"/>
+          </a:p>
+        </p:txBody>
+      </p:sp>
+      <p:sp>
+        <p:nvSpPr>
+          <p:cNvPr id="78853" name="Rectangle 5"/>
+          <p:cNvSpPr>
+            <a:spLocks/>
+          </p:cNvSpPr>
+          <p:nvPr/>
+        </p:nvSpPr>
+        <p:spPr bwMode="auto">
+          <a:xfrm>
+            <a:off x="7004050" y="6486525"/>
+            <a:ext cx="2146300" cy="365125"/>
+          </a:xfrm>
+          <a:prstGeom prst="rect">
+            <a:avLst/>
+          </a:prstGeom>
+          <a:noFill/>
+          <a:ln>
+            <a:noFill/>
+          </a:ln>
+          <a:extLst>
+            <a:ext uri="{909E8E84-426E-40dd-AFC4-6F175D3DCCD1}">
+              <a14:hiddenFill xmlns:a14="http://schemas.microsoft.com/office/drawing/2010/main">
+                <a:solidFill>
+                  <a:srgbClr val="FFFFFF"/>
+                </a:solidFill>
+              </a14:hiddenFill>
+            </a:ext>
+            <a:ext uri="{91240B29-F687-4f45-9708-019B960494DF}">
+              <a14:hiddenLine xmlns:a14="http://schemas.microsoft.com/office/drawing/2010/main" w="12700" cap="rnd">
+                <a:solidFill>
+                  <a:schemeClr val="tx1"/>
+                </a:solidFill>
+                <a:round/>
+                <a:headEnd/>
+                <a:tailEnd/>
+              </a14:hiddenLine>
+            </a:ext>
+          </a:extLst>
+        </p:spPr>
+        <p:txBody>
+          <a:bodyPr lIns="0" tIns="0" rIns="0" bIns="0"/>
+          <a:lstStyle/>
+          <a:p>
+            <a:endParaRPr lang="en-US"/>
+          </a:p>
+        </p:txBody>
+      </p:sp>
+      <p:sp>
+        <p:nvSpPr>
+          <p:cNvPr id="12295" name="Rectangle 7"/>
+          <p:cNvSpPr>
+            <a:spLocks noGrp="1" noChangeArrowheads="1"/>
           </p:cNvSpPr>
           <p:nvPr>
             <p:ph type="title"/>
@@ -4319,18 +4750,26 @@
           <a:bodyPr/>
           <a:lstStyle/>
           <a:p>
-            <a:r>
-              <a:rPr lang="en-US" dirty="0"/>
-              <a:t>What is Data Management?</a:t>
-            </a:r>
-          </a:p>
-        </p:txBody>
-      </p:sp>
-      <p:sp>
-        <p:nvSpPr>
-          <p:cNvPr id="3" name="Content Placeholder 2"/>
-          <p:cNvSpPr>
-            <a:spLocks noGrp="1"/>
+            <a:pPr eaLnBrk="1" hangingPunct="1">
+              <a:defRPr/>
+            </a:pPr>
+            <a:r>
+              <a:rPr lang="en-US" dirty="0" smtClean="0"/>
+              <a:t>Barriers to </a:t>
+            </a:r>
+            <a:r>
+              <a:rPr lang="en-US" dirty="0" smtClean="0"/>
+              <a:t>[Synthesis] Science</a:t>
+            </a:r>
+            <a:endParaRPr lang="en-US" dirty="0" smtClean="0"/>
+          </a:p>
+        </p:txBody>
+      </p:sp>
+      <p:sp>
+        <p:nvSpPr>
+          <p:cNvPr id="12294" name="Rectangle 6"/>
+          <p:cNvSpPr>
+            <a:spLocks noGrp="1" noChangeArrowheads="1"/>
           </p:cNvSpPr>
           <p:nvPr>
             <p:ph idx="1"/>
@@ -4338,83 +4777,171 @@
         </p:nvSpPr>
         <p:spPr/>
         <p:txBody>
-          <a:bodyPr>
-            <a:normAutofit/>
-          </a:bodyPr>
+          <a:bodyPr/>
           <a:lstStyle/>
           <a:p>
-            <a:pPr marL="0" indent="0">
-              <a:buNone/>
+            <a:pPr marL="419100" indent="-419100" eaLnBrk="1" hangingPunct="1">
+              <a:spcBef>
+                <a:spcPct val="0"/>
+              </a:spcBef>
+              <a:buClr>
+                <a:srgbClr val="1A435D"/>
+              </a:buClr>
+              <a:buFont typeface="Arial" charset="0"/>
+              <a:buChar char="•"/>
+              <a:defRPr/>
             </a:pPr>
             <a:r>
-              <a:rPr lang="en-US" dirty="0" smtClean="0"/>
-              <a:t>“Data </a:t>
-            </a:r>
-            <a:r>
-              <a:rPr lang="en-US" dirty="0"/>
-              <a:t>management is the process of controlling the information generated during a research project. Any research will require some level of data management, and funding agencies are increasingly requiring scholars to plan and execute good data management practices</a:t>
-            </a:r>
-            <a:r>
-              <a:rPr lang="en-US" dirty="0" smtClean="0"/>
-              <a:t>.”</a:t>
-            </a:r>
-          </a:p>
-          <a:p>
-            <a:pPr marL="0" indent="0">
-              <a:buNone/>
+              <a:rPr lang="en-US" sz="2400" dirty="0" smtClean="0"/>
+              <a:t>Data not preserved</a:t>
+            </a:r>
+          </a:p>
+          <a:p>
+            <a:pPr lvl="1" eaLnBrk="1" hangingPunct="1">
+              <a:defRPr/>
             </a:pPr>
-            <a:endParaRPr lang="en-US" dirty="0" smtClean="0"/>
-          </a:p>
-          <a:p>
-            <a:pPr marL="0" indent="0">
-              <a:buNone/>
+            <a:r>
+              <a:rPr lang="en-US" sz="2000" dirty="0" smtClean="0"/>
+              <a:t>Tiny proportion of ecological data are readily available</a:t>
+            </a:r>
+          </a:p>
+          <a:p>
+            <a:pPr lvl="1" eaLnBrk="1" hangingPunct="1">
+              <a:defRPr/>
             </a:pPr>
+            <a:endParaRPr lang="en-US" sz="2000" dirty="0" smtClean="0"/>
+          </a:p>
+          <a:p>
+            <a:pPr marL="419100" indent="-419100" eaLnBrk="1" hangingPunct="1">
+              <a:buFont typeface="Arial" charset="0"/>
+              <a:buChar char="•"/>
+              <a:defRPr/>
+            </a:pPr>
             <a:r>
               <a:rPr lang="en-US" sz="2400" dirty="0" smtClean="0"/>
-              <a:t>Source:</a:t>
-            </a:r>
-            <a:endParaRPr lang="en-US" sz="2400" dirty="0"/>
-          </a:p>
-          <a:p>
-            <a:pPr marL="0" indent="0">
-              <a:buNone/>
+              <a:t>Dispersed, isolated repositories</a:t>
+            </a:r>
+          </a:p>
+          <a:p>
+            <a:pPr lvl="1" eaLnBrk="1" hangingPunct="1">
+              <a:defRPr/>
             </a:pPr>
             <a:r>
-              <a:rPr lang="en-US" sz="2400" dirty="0" smtClean="0">
-                <a:hlinkClick r:id="rId2"/>
-              </a:rPr>
-              <a:t>http</a:t>
-            </a:r>
-            <a:r>
-              <a:rPr lang="en-US" sz="2400" dirty="0">
-                <a:hlinkClick r:id="rId2"/>
-              </a:rPr>
-              <a:t>://www.libraries.psu.edu/psul/pubcur/</a:t>
-            </a:r>
-            <a:r>
-              <a:rPr lang="en-US" sz="2400" dirty="0" smtClean="0">
-                <a:hlinkClick r:id="rId2"/>
-              </a:rPr>
-              <a:t>what_is_dm.html</a:t>
-            </a:r>
+              <a:rPr lang="en-US" sz="2000" dirty="0" smtClean="0"/>
+              <a:t>Each community has its own; disconnected; underutilized</a:t>
+            </a:r>
+          </a:p>
+          <a:p>
+            <a:pPr lvl="1" eaLnBrk="1" hangingPunct="1">
+              <a:defRPr/>
+            </a:pPr>
+            <a:endParaRPr lang="en-US" sz="2000" dirty="0" smtClean="0"/>
+          </a:p>
+          <a:p>
+            <a:pPr marL="419100" indent="-419100" eaLnBrk="1" hangingPunct="1">
+              <a:buClr>
+                <a:srgbClr val="1A435D"/>
+              </a:buClr>
+              <a:buFont typeface="Arial" charset="0"/>
+              <a:buChar char="•"/>
+              <a:defRPr/>
+            </a:pPr>
             <a:r>
               <a:rPr lang="en-US" sz="2400" dirty="0" smtClean="0"/>
-              <a:t> </a:t>
-            </a:r>
-            <a:endParaRPr lang="en-US" sz="2400" dirty="0"/>
+              <a:t>Lack of software interoperability</a:t>
+            </a:r>
+          </a:p>
+          <a:p>
+            <a:pPr lvl="1" eaLnBrk="1" hangingPunct="1">
+              <a:defRPr/>
+            </a:pPr>
+            <a:r>
+              <a:rPr lang="en-US" sz="2000" dirty="0" err="1" smtClean="0"/>
+              <a:t>Metacat</a:t>
+            </a:r>
+            <a:r>
+              <a:rPr lang="en-US" sz="2000" dirty="0" smtClean="0"/>
+              <a:t>, </a:t>
+            </a:r>
+            <a:r>
+              <a:rPr lang="en-US" sz="2000" dirty="0" err="1" smtClean="0"/>
+              <a:t>DSpace</a:t>
+            </a:r>
+            <a:r>
+              <a:rPr lang="en-US" sz="2000" dirty="0" smtClean="0"/>
+              <a:t>, Mercury, </a:t>
+            </a:r>
+            <a:r>
+              <a:rPr lang="en-US" sz="2000" dirty="0" err="1" smtClean="0"/>
+              <a:t>iRODS</a:t>
+            </a:r>
+            <a:r>
+              <a:rPr lang="en-US" sz="2000" dirty="0" smtClean="0"/>
+              <a:t>, </a:t>
+            </a:r>
+            <a:r>
+              <a:rPr lang="en-US" sz="2000" dirty="0" err="1" smtClean="0"/>
+              <a:t>XMCat</a:t>
+            </a:r>
+            <a:r>
+              <a:rPr lang="en-US" sz="2000" dirty="0" smtClean="0"/>
+              <a:t>, </a:t>
+            </a:r>
+            <a:r>
+              <a:rPr lang="en-US" sz="2000" dirty="0" err="1" smtClean="0"/>
+              <a:t>OPeNDAP</a:t>
+            </a:r>
+            <a:r>
+              <a:rPr lang="en-US" sz="2000" dirty="0" smtClean="0"/>
+              <a:t>, ...</a:t>
+            </a:r>
+          </a:p>
+          <a:p>
+            <a:pPr lvl="1" eaLnBrk="1" hangingPunct="1">
+              <a:defRPr/>
+            </a:pPr>
+            <a:endParaRPr lang="en-US" sz="2000" dirty="0" smtClean="0"/>
+          </a:p>
+          <a:p>
+            <a:pPr marL="419100" indent="-419100" eaLnBrk="1" hangingPunct="1">
+              <a:buFont typeface="Arial" charset="0"/>
+              <a:buChar char="•"/>
+              <a:defRPr/>
+            </a:pPr>
+            <a:r>
+              <a:rPr lang="en-US" sz="2400" dirty="0" smtClean="0"/>
+              <a:t>Heterogeneous data</a:t>
+            </a:r>
+          </a:p>
+          <a:p>
+            <a:pPr lvl="1" eaLnBrk="1" hangingPunct="1">
+              <a:defRPr/>
+            </a:pPr>
+            <a:r>
+              <a:rPr lang="en-US" sz="2000" dirty="0" smtClean="0"/>
+              <a:t>Many data formats, metadata formats, and varying semantics</a:t>
+            </a:r>
           </a:p>
         </p:txBody>
       </p:sp>
     </p:spTree>
     <p:extLst>
       <p:ext uri="{BB962C8B-B14F-4D97-AF65-F5344CB8AC3E}">
-        <p14:creationId xmlns:p14="http://schemas.microsoft.com/office/powerpoint/2010/main" val="2736453919"/>
+        <p14:creationId xmlns:p14="http://schemas.microsoft.com/office/powerpoint/2010/main" val="3924811006"/>
       </p:ext>
     </p:extLst>
   </p:cSld>
   <p:clrMapOvr>
     <a:masterClrMapping/>
   </p:clrMapOvr>
+  <mc:AlternateContent xmlns:mc="http://schemas.openxmlformats.org/markup-compatibility/2006" xmlns:p14="http://schemas.microsoft.com/office/powerpoint/2010/main">
+    <mc:Choice Requires="p14">
+      <p:transition spd="slow" p14:dur="2000"/>
+    </mc:Choice>
+    <mc:Fallback xmlns="">
+      <p:transition xmlns:p14="http://schemas.microsoft.com/office/powerpoint/2010/main" spd="slow"/>
+    </mc:Fallback>
+  </mc:AlternateContent>
   <p:timing>
     <p:tnLst>
       <p:par>
@@ -4458,6 +4985,144 @@
           <a:lstStyle/>
           <a:p>
             <a:r>
+              <a:rPr lang="en-US" dirty="0"/>
+              <a:t>What is Data Management?</a:t>
+            </a:r>
+          </a:p>
+        </p:txBody>
+      </p:sp>
+      <p:sp>
+        <p:nvSpPr>
+          <p:cNvPr id="3" name="Content Placeholder 2"/>
+          <p:cNvSpPr>
+            <a:spLocks noGrp="1"/>
+          </p:cNvSpPr>
+          <p:nvPr>
+            <p:ph idx="1"/>
+          </p:nvPr>
+        </p:nvSpPr>
+        <p:spPr/>
+        <p:txBody>
+          <a:bodyPr>
+            <a:normAutofit/>
+          </a:bodyPr>
+          <a:lstStyle/>
+          <a:p>
+            <a:pPr marL="0" indent="0">
+              <a:buNone/>
+            </a:pPr>
+            <a:r>
+              <a:rPr lang="en-US" dirty="0" smtClean="0"/>
+              <a:t>“Data </a:t>
+            </a:r>
+            <a:r>
+              <a:rPr lang="en-US" dirty="0"/>
+              <a:t>management is the process of controlling the information generated during a research project. Any research will require some level of data management, and funding agencies are increasingly requiring scholars to plan and execute good data management practices</a:t>
+            </a:r>
+            <a:r>
+              <a:rPr lang="en-US" dirty="0" smtClean="0"/>
+              <a:t>.”</a:t>
+            </a:r>
+          </a:p>
+          <a:p>
+            <a:pPr marL="0" indent="0">
+              <a:buNone/>
+            </a:pPr>
+            <a:endParaRPr lang="en-US" dirty="0" smtClean="0"/>
+          </a:p>
+          <a:p>
+            <a:pPr marL="0" indent="0">
+              <a:buNone/>
+            </a:pPr>
+            <a:r>
+              <a:rPr lang="en-US" sz="2400" dirty="0" smtClean="0"/>
+              <a:t>Source:</a:t>
+            </a:r>
+            <a:endParaRPr lang="en-US" sz="2400" dirty="0"/>
+          </a:p>
+          <a:p>
+            <a:pPr marL="0" indent="0">
+              <a:buNone/>
+            </a:pPr>
+            <a:r>
+              <a:rPr lang="en-US" sz="2400" dirty="0" smtClean="0">
+                <a:hlinkClick r:id="rId2"/>
+              </a:rPr>
+              <a:t>http</a:t>
+            </a:r>
+            <a:r>
+              <a:rPr lang="en-US" sz="2400" dirty="0">
+                <a:hlinkClick r:id="rId2"/>
+              </a:rPr>
+              <a:t>://www.libraries.psu.edu/psul/pubcur/</a:t>
+            </a:r>
+            <a:r>
+              <a:rPr lang="en-US" sz="2400" dirty="0" smtClean="0">
+                <a:hlinkClick r:id="rId2"/>
+              </a:rPr>
+              <a:t>what_is_dm.html</a:t>
+            </a:r>
+            <a:r>
+              <a:rPr lang="en-US" sz="2400" dirty="0" smtClean="0"/>
+              <a:t> </a:t>
+            </a:r>
+            <a:endParaRPr lang="en-US" sz="2400" dirty="0"/>
+          </a:p>
+        </p:txBody>
+      </p:sp>
+    </p:spTree>
+    <p:extLst>
+      <p:ext uri="{BB962C8B-B14F-4D97-AF65-F5344CB8AC3E}">
+        <p14:creationId xmlns:p14="http://schemas.microsoft.com/office/powerpoint/2010/main" val="2736453919"/>
+      </p:ext>
+    </p:extLst>
+  </p:cSld>
+  <p:clrMapOvr>
+    <a:masterClrMapping/>
+  </p:clrMapOvr>
+  <p:timing>
+    <p:tnLst>
+      <p:par>
+        <p:cTn xmlns:p14="http://schemas.microsoft.com/office/powerpoint/2010/main" id="1" dur="indefinite" restart="never" nodeType="tmRoot"/>
+      </p:par>
+    </p:tnLst>
+  </p:timing>
+</p:sld>
+</file>
+
+<file path=ppt/slides/slide12.xml><?xml version="1.0" encoding="utf-8"?>
+<p:sld xmlns:a="http://schemas.openxmlformats.org/drawingml/2006/main" xmlns:r="http://schemas.openxmlformats.org/officeDocument/2006/relationships" xmlns:p="http://schemas.openxmlformats.org/presentationml/2006/main">
+  <p:cSld>
+    <p:spTree>
+      <p:nvGrpSpPr>
+        <p:cNvPr id="1" name=""/>
+        <p:cNvGrpSpPr/>
+        <p:nvPr/>
+      </p:nvGrpSpPr>
+      <p:grpSpPr>
+        <a:xfrm>
+          <a:off x="0" y="0"/>
+          <a:ext cx="0" cy="0"/>
+          <a:chOff x="0" y="0"/>
+          <a:chExt cx="0" cy="0"/>
+        </a:xfrm>
+      </p:grpSpPr>
+      <p:sp>
+        <p:nvSpPr>
+          <p:cNvPr id="2" name="Title 1"/>
+          <p:cNvSpPr>
+            <a:spLocks noGrp="1"/>
+          </p:cNvSpPr>
+          <p:nvPr>
+            <p:ph type="title"/>
+          </p:nvPr>
+        </p:nvSpPr>
+        <p:spPr/>
+        <p:txBody>
+          <a:bodyPr/>
+          <a:lstStyle/>
+          <a:p>
+            <a:r>
               <a:rPr lang="en-US" dirty="0" smtClean="0"/>
               <a:t>Why does it matter?</a:t>
             </a:r>
@@ -4483,82 +5148,96 @@
         </p:spPr>
         <p:txBody>
           <a:bodyPr>
-            <a:normAutofit fontScale="62500" lnSpcReduction="20000"/>
+            <a:noAutofit/>
           </a:bodyPr>
           <a:lstStyle/>
           <a:p>
             <a:r>
+              <a:rPr lang="en-US" sz="2400" dirty="0"/>
+              <a:t>The outcome of your research depends in part on how well you manage your data. Managing data helps you as a researcher organize research files and data for easier access and analysis. It helps ensure the quality of your research. It supports the published results of your work and, in the long term, helps ensure accountability in data analysis. Effective data management practices include:</a:t>
+            </a:r>
+          </a:p>
+          <a:p>
+            <a:pPr lvl="1"/>
+            <a:r>
+              <a:rPr lang="en-US" sz="2000" dirty="0"/>
+              <a:t>Designating the responsibilities of every individual involved in the study.</a:t>
+            </a:r>
+          </a:p>
+          <a:p>
+            <a:pPr lvl="1"/>
+            <a:r>
+              <a:rPr lang="en-US" sz="2000" dirty="0"/>
+              <a:t>Determining how data will be stored and backed up.</a:t>
+            </a:r>
+          </a:p>
+          <a:p>
+            <a:pPr lvl="1"/>
+            <a:r>
+              <a:rPr lang="en-US" sz="2000" dirty="0"/>
+              <a:t>Implementing the data management plan.</a:t>
+            </a:r>
+          </a:p>
+          <a:p>
+            <a:pPr lvl="1"/>
+            <a:r>
+              <a:rPr lang="en-US" sz="2000" dirty="0"/>
+              <a:t>Deciding how data will be dealt with through each modification of the study</a:t>
+            </a:r>
+            <a:r>
+              <a:rPr lang="en-US" sz="2000" dirty="0" smtClean="0"/>
+              <a:t>.</a:t>
+            </a:r>
+            <a:endParaRPr lang="en-US" sz="2000" dirty="0" smtClean="0"/>
+          </a:p>
+        </p:txBody>
+      </p:sp>
+      <p:sp>
+        <p:nvSpPr>
+          <p:cNvPr id="4" name="Rectangle 3"/>
+          <p:cNvSpPr/>
+          <p:nvPr/>
+        </p:nvSpPr>
+        <p:spPr>
+          <a:xfrm>
+            <a:off x="183306" y="6368893"/>
+            <a:ext cx="8811758" cy="369332"/>
+          </a:xfrm>
+          <a:prstGeom prst="rect">
+            <a:avLst/>
+          </a:prstGeom>
+        </p:spPr>
+        <p:txBody>
+          <a:bodyPr wrap="square">
+            <a:spAutoFit/>
+          </a:bodyPr>
+          <a:lstStyle/>
+          <a:p>
+            <a:r>
               <a:rPr lang="en-US" dirty="0"/>
-              <a:t>The outcome of your research depends in part on how well you manage your data. Managing data helps you as a researcher organize research files and data for easier access and analysis. It helps ensure the quality of your research. It supports the published results of your work and, in the long term, helps ensure accountability in data analysis. Effective data management practices include:</a:t>
-            </a:r>
-          </a:p>
-          <a:p>
-            <a:pPr lvl="1"/>
-            <a:r>
-              <a:rPr lang="en-US" dirty="0"/>
-              <a:t>Designating the responsibilities of every individual involved in the study.</a:t>
-            </a:r>
-          </a:p>
-          <a:p>
-            <a:pPr lvl="1"/>
-            <a:r>
-              <a:rPr lang="en-US" dirty="0"/>
-              <a:t>Determining how data will be stored and backed up.</a:t>
-            </a:r>
-          </a:p>
-          <a:p>
-            <a:pPr lvl="1"/>
-            <a:r>
-              <a:rPr lang="en-US" dirty="0"/>
-              <a:t>Implementing the data management plan.</a:t>
-            </a:r>
-          </a:p>
-          <a:p>
-            <a:pPr lvl="1"/>
-            <a:r>
-              <a:rPr lang="en-US" dirty="0"/>
-              <a:t>Deciding how data will be dealt with through each modification of the study</a:t>
+              <a:t>Source</a:t>
             </a:r>
             <a:r>
               <a:rPr lang="en-US" dirty="0" smtClean="0"/>
-              <a:t>.</a:t>
-            </a:r>
-          </a:p>
-          <a:p>
-            <a:pPr lvl="1"/>
-            <a:endParaRPr lang="en-US" dirty="0" smtClean="0"/>
-          </a:p>
-          <a:p>
-            <a:pPr lvl="1"/>
-            <a:endParaRPr lang="en-US" dirty="0"/>
-          </a:p>
-          <a:p>
-            <a:pPr lvl="1"/>
-            <a:endParaRPr lang="en-US" dirty="0"/>
-          </a:p>
-          <a:p>
-            <a:pPr marL="0" indent="0">
-              <a:buNone/>
-            </a:pPr>
-            <a:r>
-              <a:rPr lang="en-US" dirty="0"/>
-              <a:t>Source:</a:t>
-            </a:r>
-          </a:p>
-          <a:p>
-            <a:pPr marL="0" indent="0">
-              <a:buNone/>
-            </a:pPr>
+              <a:t>:  </a:t>
+            </a:r>
+            <a:r>
+              <a:rPr lang="en-US" dirty="0" smtClean="0">
+                <a:hlinkClick r:id="rId3"/>
+              </a:rPr>
+              <a:t>http</a:t>
+            </a:r>
             <a:r>
               <a:rPr lang="en-US" dirty="0">
                 <a:hlinkClick r:id="rId3"/>
               </a:rPr>
-              <a:t>http://www.libraries.psu.edu/psul/pubcur/what_is_dm.html</a:t>
+              <a:t>://www.libraries.psu.edu/psul/pubcur/what_is_dm.html</a:t>
             </a:r>
             <a:r>
               <a:rPr lang="en-US" dirty="0"/>
               <a:t> </a:t>
             </a:r>
+            <a:endParaRPr lang="en-US" dirty="0"/>
           </a:p>
         </p:txBody>
       </p:sp>
@@ -4572,10 +5251,17 @@
   <p:clrMapOvr>
     <a:masterClrMapping/>
   </p:clrMapOvr>
+  <p:timing>
+    <p:tnLst>
+      <p:par>
+        <p:cTn xmlns:p14="http://schemas.microsoft.com/office/powerpoint/2010/main" id="1" dur="indefinite" restart="never" nodeType="tmRoot"/>
+      </p:par>
+    </p:tnLst>
+  </p:timing>
 </p:sld>
 </file>
 
-<file path=ppt/slides/slide12.xml><?xml version="1.0" encoding="utf-8"?>
+<file path=ppt/slides/slide13.xml><?xml version="1.0" encoding="utf-8"?>
 <p:sld xmlns:a="http://schemas.openxmlformats.org/drawingml/2006/main" xmlns:r="http://schemas.openxmlformats.org/officeDocument/2006/relationships" xmlns:p="http://schemas.openxmlformats.org/presentationml/2006/main">
   <p:cSld>
     <p:spTree>
@@ -4659,7 +5345,7 @@
 </p:sld>
 </file>
 
-<file path=ppt/slides/slide13.xml><?xml version="1.0" encoding="utf-8"?>
+<file path=ppt/slides/slide14.xml><?xml version="1.0" encoding="utf-8"?>
 <p:sld xmlns:a="http://schemas.openxmlformats.org/drawingml/2006/main" xmlns:r="http://schemas.openxmlformats.org/officeDocument/2006/relationships" xmlns:p="http://schemas.openxmlformats.org/presentationml/2006/main">
   <p:cSld>
     <p:spTree>
@@ -4743,7 +5429,7 @@
 </p:sld>
 </file>
 
-<file path=ppt/slides/slide14.xml><?xml version="1.0" encoding="utf-8"?>
+<file path=ppt/slides/slide15.xml><?xml version="1.0" encoding="utf-8"?>
 <p:sld xmlns:a="http://schemas.openxmlformats.org/drawingml/2006/main" xmlns:r="http://schemas.openxmlformats.org/officeDocument/2006/relationships" xmlns:p="http://schemas.openxmlformats.org/presentationml/2006/main">
   <p:cSld>
     <p:spTree>
@@ -5013,11 +5699,11 @@
   <p:clrMapOvr>
     <a:masterClrMapping/>
   </p:clrMapOvr>
-  <mc:AlternateContent xmlns:mc="http://schemas.openxmlformats.org/markup-compatibility/2006">
-    <mc:Choice xmlns:p14="http://schemas.microsoft.com/office/powerpoint/2010/main" Requires="p14">
+  <mc:AlternateContent xmlns:mc="http://schemas.openxmlformats.org/markup-compatibility/2006" xmlns:p14="http://schemas.microsoft.com/office/powerpoint/2010/main">
+    <mc:Choice Requires="p14">
       <p:transition spd="slow" p14:dur="2000"/>
     </mc:Choice>
-    <mc:Fallback>
+    <mc:Fallback xmlns="">
       <p:transition xmlns:p14="http://schemas.microsoft.com/office/powerpoint/2010/main" spd="slow"/>
     </mc:Fallback>
   </mc:AlternateContent>
@@ -5031,7 +5717,7 @@
 </p:sld>
 </file>
 
-<file path=ppt/slides/slide15.xml><?xml version="1.0" encoding="utf-8"?>
+<file path=ppt/slides/slide16.xml><?xml version="1.0" encoding="utf-8"?>
 <p:sld xmlns:a="http://schemas.openxmlformats.org/drawingml/2006/main" xmlns:r="http://schemas.openxmlformats.org/officeDocument/2006/relationships" xmlns:p="http://schemas.openxmlformats.org/presentationml/2006/main">
   <p:cSld>
     <p:spTree>
@@ -5075,11 +5761,7 @@
             </a:pPr>
             <a:r>
               <a:rPr lang="en-US" sz="2400" dirty="0" smtClean="0"/>
-              <a:t>Example: Preserve </a:t>
-            </a:r>
-            <a:r>
-              <a:rPr lang="en-US" sz="2400" dirty="0" smtClean="0"/>
-              <a:t>data in the </a:t>
+              <a:t>Example: Preserve data in the </a:t>
             </a:r>
             <a:r>
               <a:rPr lang="en-US" sz="2400" dirty="0"/>
@@ -5413,7 +6095,7 @@
                 <a:sym typeface="Calibri" charset="0"/>
               </a:rPr>
               <a:pPr algn="r" eaLnBrk="1" hangingPunct="1"/>
-              <a:t>15</a:t>
+              <a:t>16</a:t>
             </a:fld>
             <a:endParaRPr lang="en-US" sz="1200">
               <a:solidFill>
@@ -5535,7 +6217,7 @@
           <a:graphicData uri="http://schemas.openxmlformats.org/presentationml/2006/ole">
             <mc:AlternateContent xmlns:mc="http://schemas.openxmlformats.org/markup-compatibility/2006">
               <mc:Choice xmlns:v="urn:schemas-microsoft-com:vml" Requires="v">
-                <p:oleObj spid="_x0000_s1030" name="Chart" r:id="rId5" imgW="3497360" imgH="2658228" progId="MSGraph.Chart.8">
+                <p:oleObj spid="_x0000_s1037" name="Chart" r:id="rId5" imgW="3497360" imgH="2658228" progId="MSGraph.Chart.8">
                   <p:embed/>
                 </p:oleObj>
               </mc:Choice>
@@ -6557,11 +7239,11 @@
   <p:clrMapOvr>
     <a:masterClrMapping/>
   </p:clrMapOvr>
-  <mc:AlternateContent xmlns:mc="http://schemas.openxmlformats.org/markup-compatibility/2006">
-    <mc:Choice xmlns:p14="http://schemas.microsoft.com/office/powerpoint/2010/main" Requires="p14">
+  <mc:AlternateContent xmlns:mc="http://schemas.openxmlformats.org/markup-compatibility/2006" xmlns:p14="http://schemas.microsoft.com/office/powerpoint/2010/main">
+    <mc:Choice Requires="p14">
       <p:transition spd="slow" p14:dur="2000"/>
     </mc:Choice>
-    <mc:Fallback>
+    <mc:Fallback xmlns="">
       <p:transition xmlns:p14="http://schemas.microsoft.com/office/powerpoint/2010/main" spd="slow"/>
     </mc:Fallback>
   </mc:AlternateContent>
@@ -6575,7 +7257,7 @@
 </p:sld>
 </file>
 
-<file path=ppt/slides/slide16.xml><?xml version="1.0" encoding="utf-8"?>
+<file path=ppt/slides/slide17.xml><?xml version="1.0" encoding="utf-8"?>
 <p:sld xmlns:a="http://schemas.openxmlformats.org/drawingml/2006/main" xmlns:r="http://schemas.openxmlformats.org/officeDocument/2006/relationships" xmlns:p="http://schemas.openxmlformats.org/presentationml/2006/main">
   <p:cSld>
     <p:spTree>
@@ -6746,11 +7428,11 @@
   <p:clrMapOvr>
     <a:masterClrMapping/>
   </p:clrMapOvr>
-  <mc:AlternateContent xmlns:mc="http://schemas.openxmlformats.org/markup-compatibility/2006">
-    <mc:Choice xmlns:p14="http://schemas.microsoft.com/office/powerpoint/2010/main" Requires="p14">
+  <mc:AlternateContent xmlns:mc="http://schemas.openxmlformats.org/markup-compatibility/2006" xmlns:p14="http://schemas.microsoft.com/office/powerpoint/2010/main">
+    <mc:Choice Requires="p14">
       <p:transition spd="slow" p14:dur="2000"/>
     </mc:Choice>
-    <mc:Fallback>
+    <mc:Fallback xmlns="">
       <p:transition xmlns:p14="http://schemas.microsoft.com/office/powerpoint/2010/main" spd="slow"/>
     </mc:Fallback>
   </mc:AlternateContent>
@@ -6764,7 +7446,7 @@
 </p:sld>
 </file>
 
-<file path=ppt/slides/slide17.xml><?xml version="1.0" encoding="utf-8"?>
+<file path=ppt/slides/slide18.xml><?xml version="1.0" encoding="utf-8"?>
 <p:sld xmlns:a="http://schemas.openxmlformats.org/drawingml/2006/main" xmlns:r="http://schemas.openxmlformats.org/officeDocument/2006/relationships" xmlns:p="http://schemas.openxmlformats.org/presentationml/2006/main">
   <p:cSld>
     <p:spTree>
@@ -6938,7 +7620,11 @@
             </a:pPr>
             <a:r>
               <a:rPr lang="en-US" dirty="0" smtClean="0"/>
-              <a:t>        A Federation</a:t>
+              <a:t>A </a:t>
+            </a:r>
+            <a:r>
+              <a:rPr lang="en-US" dirty="0" smtClean="0"/>
+              <a:t>Federation</a:t>
             </a:r>
             <a:r>
               <a:rPr lang="en-US" dirty="0"/>
@@ -7700,7 +8386,7 @@
         </p:nvGrpSpPr>
         <p:grpSpPr bwMode="auto">
           <a:xfrm>
-            <a:off x="377825" y="103188"/>
+            <a:off x="927742" y="5653882"/>
             <a:ext cx="2413000" cy="944562"/>
             <a:chOff x="0" y="0"/>
             <a:chExt cx="1520" cy="595"/>
@@ -7809,11 +8495,11 @@
   <p:clrMapOvr>
     <a:masterClrMapping/>
   </p:clrMapOvr>
-  <mc:AlternateContent xmlns:mc="http://schemas.openxmlformats.org/markup-compatibility/2006">
-    <mc:Choice xmlns:p14="http://schemas.microsoft.com/office/powerpoint/2010/main" Requires="p14">
+  <mc:AlternateContent xmlns:mc="http://schemas.openxmlformats.org/markup-compatibility/2006" xmlns:p14="http://schemas.microsoft.com/office/powerpoint/2010/main">
+    <mc:Choice Requires="p14">
       <p:transition spd="slow" p14:dur="2000"/>
     </mc:Choice>
-    <mc:Fallback>
+    <mc:Fallback xmlns="">
       <p:transition xmlns:p14="http://schemas.microsoft.com/office/powerpoint/2010/main" spd="slow"/>
     </mc:Fallback>
   </mc:AlternateContent>
@@ -7827,7 +8513,7 @@
 </p:sld>
 </file>
 
-<file path=ppt/slides/slide18.xml><?xml version="1.0" encoding="utf-8"?>
+<file path=ppt/slides/slide19.xml><?xml version="1.0" encoding="utf-8"?>
 <p:sld xmlns:a="http://schemas.openxmlformats.org/drawingml/2006/main" xmlns:r="http://schemas.openxmlformats.org/officeDocument/2006/relationships" xmlns:p="http://schemas.openxmlformats.org/presentationml/2006/main">
   <p:cSld>
     <p:spTree>
@@ -8114,7 +8800,11 @@
             </a:pPr>
             <a:r>
               <a:rPr lang="en-US" dirty="0" smtClean="0"/>
-              <a:t>         Creating Interoperability</a:t>
+              <a:t>Creating </a:t>
+            </a:r>
+            <a:r>
+              <a:rPr lang="en-US" dirty="0" smtClean="0"/>
+              <a:t>Interoperability</a:t>
             </a:r>
           </a:p>
         </p:txBody>
@@ -8426,7 +9116,7 @@
         </p:nvGrpSpPr>
         <p:grpSpPr bwMode="auto">
           <a:xfrm>
-            <a:off x="377825" y="103188"/>
+            <a:off x="377825" y="5461835"/>
             <a:ext cx="2413000" cy="944562"/>
             <a:chOff x="0" y="0"/>
             <a:chExt cx="1520" cy="595"/>
@@ -8535,11 +9225,11 @@
   <p:clrMapOvr>
     <a:masterClrMapping/>
   </p:clrMapOvr>
-  <mc:AlternateContent xmlns:mc="http://schemas.openxmlformats.org/markup-compatibility/2006">
-    <mc:Choice xmlns:p14="http://schemas.microsoft.com/office/powerpoint/2010/main" Requires="p14">
+  <mc:AlternateContent xmlns:mc="http://schemas.openxmlformats.org/markup-compatibility/2006" xmlns:p14="http://schemas.microsoft.com/office/powerpoint/2010/main">
+    <mc:Choice Requires="p14">
       <p:transition spd="slow" p14:dur="2000"/>
     </mc:Choice>
-    <mc:Fallback>
+    <mc:Fallback xmlns="">
       <p:transition xmlns:p14="http://schemas.microsoft.com/office/powerpoint/2010/main" spd="slow"/>
     </mc:Fallback>
   </mc:AlternateContent>
@@ -8553,7 +9243,135 @@
 </p:sld>
 </file>
 
-<file path=ppt/slides/slide19.xml><?xml version="1.0" encoding="utf-8"?>
+<file path=ppt/slides/slide2.xml><?xml version="1.0" encoding="utf-8"?>
+<p:sld xmlns:a="http://schemas.openxmlformats.org/drawingml/2006/main" xmlns:r="http://schemas.openxmlformats.org/officeDocument/2006/relationships" xmlns:p="http://schemas.openxmlformats.org/presentationml/2006/main">
+  <p:cSld>
+    <p:spTree>
+      <p:nvGrpSpPr>
+        <p:cNvPr id="1" name=""/>
+        <p:cNvGrpSpPr/>
+        <p:nvPr/>
+      </p:nvGrpSpPr>
+      <p:grpSpPr>
+        <a:xfrm>
+          <a:off x="0" y="0"/>
+          <a:ext cx="0" cy="0"/>
+          <a:chOff x="0" y="0"/>
+          <a:chExt cx="0" cy="0"/>
+        </a:xfrm>
+      </p:grpSpPr>
+      <p:sp>
+        <p:nvSpPr>
+          <p:cNvPr id="2" name="Title 1"/>
+          <p:cNvSpPr>
+            <a:spLocks noGrp="1"/>
+          </p:cNvSpPr>
+          <p:nvPr>
+            <p:ph type="title"/>
+          </p:nvPr>
+        </p:nvSpPr>
+        <p:spPr/>
+        <p:txBody>
+          <a:bodyPr/>
+          <a:lstStyle/>
+          <a:p>
+            <a:r>
+              <a:rPr lang="en-US" dirty="0" smtClean="0"/>
+              <a:t>Goals</a:t>
+            </a:r>
+            <a:endParaRPr lang="en-US" dirty="0"/>
+          </a:p>
+        </p:txBody>
+      </p:sp>
+      <p:sp>
+        <p:nvSpPr>
+          <p:cNvPr id="3" name="Content Placeholder 2"/>
+          <p:cNvSpPr>
+            <a:spLocks noGrp="1"/>
+          </p:cNvSpPr>
+          <p:nvPr>
+            <p:ph idx="1"/>
+          </p:nvPr>
+        </p:nvSpPr>
+        <p:spPr/>
+        <p:txBody>
+          <a:bodyPr/>
+          <a:lstStyle/>
+          <a:p>
+            <a:r>
+              <a:rPr lang="en-US" b="0" i="0" dirty="0" smtClean="0">
+                <a:solidFill>
+                  <a:srgbClr val="000000"/>
+                </a:solidFill>
+                <a:latin typeface="Lucida Grande"/>
+                <a:ea typeface="Lucida Grande"/>
+                <a:cs typeface="Lucida Grande"/>
+              </a:rPr>
+              <a:t>Why does data management matter?</a:t>
+            </a:r>
+          </a:p>
+          <a:p>
+            <a:r>
+              <a:rPr lang="en-US" b="0" i="0" dirty="0" smtClean="0">
+                <a:solidFill>
+                  <a:srgbClr val="000000"/>
+                </a:solidFill>
+                <a:latin typeface="Lucida Grande"/>
+                <a:ea typeface="Lucida Grande"/>
+                <a:cs typeface="Lucida Grande"/>
+              </a:rPr>
+              <a:t>What is data management?</a:t>
+            </a:r>
+          </a:p>
+          <a:p>
+            <a:r>
+              <a:rPr lang="en-US" b="0" i="0" dirty="0" smtClean="0">
+                <a:solidFill>
+                  <a:srgbClr val="000000"/>
+                </a:solidFill>
+                <a:latin typeface="Lucida Grande"/>
+                <a:ea typeface="Lucida Grande"/>
+                <a:cs typeface="Lucida Grande"/>
+              </a:rPr>
+              <a:t>Why is data management hard?</a:t>
+            </a:r>
+          </a:p>
+          <a:p>
+            <a:r>
+              <a:rPr lang="en-US" b="0" i="0" dirty="0" smtClean="0">
+                <a:solidFill>
+                  <a:srgbClr val="000000"/>
+                </a:solidFill>
+                <a:latin typeface="Lucida Grande"/>
+                <a:ea typeface="Lucida Grande"/>
+                <a:cs typeface="Lucida Grande"/>
+              </a:rPr>
+              <a:t>Present some basic notions and principles of data management</a:t>
+            </a:r>
+          </a:p>
+        </p:txBody>
+      </p:sp>
+    </p:spTree>
+    <p:extLst>
+      <p:ext uri="{BB962C8B-B14F-4D97-AF65-F5344CB8AC3E}">
+        <p14:creationId xmlns:p14="http://schemas.microsoft.com/office/powerpoint/2010/main" val="894731067"/>
+      </p:ext>
+    </p:extLst>
+  </p:cSld>
+  <p:clrMapOvr>
+    <a:masterClrMapping/>
+  </p:clrMapOvr>
+  <p:timing>
+    <p:tnLst>
+      <p:par>
+        <p:cTn xmlns:p14="http://schemas.microsoft.com/office/powerpoint/2010/main" id="1" dur="indefinite" restart="never" nodeType="tmRoot"/>
+      </p:par>
+    </p:tnLst>
+  </p:timing>
+</p:sld>
+</file>
+
+<file path=ppt/slides/slide20.xml><?xml version="1.0" encoding="utf-8"?>
 <p:sld xmlns:a="http://schemas.openxmlformats.org/drawingml/2006/main" xmlns:r="http://schemas.openxmlformats.org/officeDocument/2006/relationships" xmlns:p="http://schemas.openxmlformats.org/presentationml/2006/main">
   <p:cSld>
     <p:spTree>
@@ -9069,340 +9887,6 @@
 </p:sld>
 </file>
 
-<file path=ppt/slides/slide2.xml><?xml version="1.0" encoding="utf-8"?>
-<p:sld xmlns:a="http://schemas.openxmlformats.org/drawingml/2006/main" xmlns:r="http://schemas.openxmlformats.org/officeDocument/2006/relationships" xmlns:p="http://schemas.openxmlformats.org/presentationml/2006/main">
-  <p:cSld>
-    <p:spTree>
-      <p:nvGrpSpPr>
-        <p:cNvPr id="1" name=""/>
-        <p:cNvGrpSpPr/>
-        <p:nvPr/>
-      </p:nvGrpSpPr>
-      <p:grpSpPr>
-        <a:xfrm>
-          <a:off x="0" y="0"/>
-          <a:ext cx="0" cy="0"/>
-          <a:chOff x="0" y="0"/>
-          <a:chExt cx="0" cy="0"/>
-        </a:xfrm>
-      </p:grpSpPr>
-      <p:sp>
-        <p:nvSpPr>
-          <p:cNvPr id="2" name="Title 1"/>
-          <p:cNvSpPr>
-            <a:spLocks noGrp="1"/>
-          </p:cNvSpPr>
-          <p:nvPr>
-            <p:ph type="title"/>
-          </p:nvPr>
-        </p:nvSpPr>
-        <p:spPr/>
-        <p:txBody>
-          <a:bodyPr/>
-          <a:lstStyle/>
-          <a:p>
-            <a:r>
-              <a:rPr lang="en-US" dirty="0" smtClean="0"/>
-              <a:t>Goals</a:t>
-            </a:r>
-            <a:endParaRPr lang="en-US" dirty="0"/>
-          </a:p>
-        </p:txBody>
-      </p:sp>
-      <p:sp>
-        <p:nvSpPr>
-          <p:cNvPr id="3" name="Content Placeholder 2"/>
-          <p:cNvSpPr>
-            <a:spLocks noGrp="1"/>
-          </p:cNvSpPr>
-          <p:nvPr>
-            <p:ph idx="1"/>
-          </p:nvPr>
-        </p:nvSpPr>
-        <p:spPr/>
-        <p:txBody>
-          <a:bodyPr/>
-          <a:lstStyle/>
-          <a:p>
-            <a:r>
-              <a:rPr lang="en-US" b="0" i="0" dirty="0" smtClean="0">
-                <a:solidFill>
-                  <a:srgbClr val="000000"/>
-                </a:solidFill>
-                <a:latin typeface="Lucida Grande"/>
-                <a:ea typeface="Lucida Grande"/>
-                <a:cs typeface="Lucida Grande"/>
-              </a:rPr>
-              <a:t>Why does data management matter?</a:t>
-            </a:r>
-          </a:p>
-          <a:p>
-            <a:r>
-              <a:rPr lang="en-US" b="0" i="0" dirty="0" smtClean="0">
-                <a:solidFill>
-                  <a:srgbClr val="000000"/>
-                </a:solidFill>
-                <a:latin typeface="Lucida Grande"/>
-                <a:ea typeface="Lucida Grande"/>
-                <a:cs typeface="Lucida Grande"/>
-              </a:rPr>
-              <a:t>What is data management?</a:t>
-            </a:r>
-          </a:p>
-          <a:p>
-            <a:r>
-              <a:rPr lang="en-US" b="0" i="0" dirty="0" smtClean="0">
-                <a:solidFill>
-                  <a:srgbClr val="000000"/>
-                </a:solidFill>
-                <a:latin typeface="Lucida Grande"/>
-                <a:ea typeface="Lucida Grande"/>
-                <a:cs typeface="Lucida Grande"/>
-              </a:rPr>
-              <a:t>Why is data management hard?</a:t>
-            </a:r>
-          </a:p>
-          <a:p>
-            <a:r>
-              <a:rPr lang="en-US" b="0" i="0" dirty="0" smtClean="0">
-                <a:solidFill>
-                  <a:srgbClr val="000000"/>
-                </a:solidFill>
-                <a:latin typeface="Lucida Grande"/>
-                <a:ea typeface="Lucida Grande"/>
-                <a:cs typeface="Lucida Grande"/>
-              </a:rPr>
-              <a:t>Present some basic notions and principles of data management</a:t>
-            </a:r>
-          </a:p>
-        </p:txBody>
-      </p:sp>
-    </p:spTree>
-    <p:extLst>
-      <p:ext uri="{BB962C8B-B14F-4D97-AF65-F5344CB8AC3E}">
-        <p14:creationId xmlns:p14="http://schemas.microsoft.com/office/powerpoint/2010/main" val="894731067"/>
-      </p:ext>
-    </p:extLst>
-  </p:cSld>
-  <p:clrMapOvr>
-    <a:masterClrMapping/>
-  </p:clrMapOvr>
-  <p:timing>
-    <p:tnLst>
-      <p:par>
-        <p:cTn xmlns:p14="http://schemas.microsoft.com/office/powerpoint/2010/main" id="1" dur="indefinite" restart="never" nodeType="tmRoot"/>
-      </p:par>
-    </p:tnLst>
-  </p:timing>
-</p:sld>
-</file>
-
-<file path=ppt/slides/slide20.xml><?xml version="1.0" encoding="utf-8"?>
-<p:sld xmlns:a="http://schemas.openxmlformats.org/drawingml/2006/main" xmlns:r="http://schemas.openxmlformats.org/officeDocument/2006/relationships" xmlns:p="http://schemas.openxmlformats.org/presentationml/2006/main">
-  <p:cSld>
-    <p:spTree>
-      <p:nvGrpSpPr>
-        <p:cNvPr id="1" name=""/>
-        <p:cNvGrpSpPr/>
-        <p:nvPr/>
-      </p:nvGrpSpPr>
-      <p:grpSpPr>
-        <a:xfrm>
-          <a:off x="0" y="0"/>
-          <a:ext cx="0" cy="0"/>
-          <a:chOff x="0" y="0"/>
-          <a:chExt cx="0" cy="0"/>
-        </a:xfrm>
-      </p:grpSpPr>
-      <p:sp>
-        <p:nvSpPr>
-          <p:cNvPr id="2" name="Title 1"/>
-          <p:cNvSpPr>
-            <a:spLocks noGrp="1"/>
-          </p:cNvSpPr>
-          <p:nvPr>
-            <p:ph type="title"/>
-          </p:nvPr>
-        </p:nvSpPr>
-        <p:spPr/>
-        <p:txBody>
-          <a:bodyPr/>
-          <a:lstStyle/>
-          <a:p>
-            <a:r>
-              <a:rPr lang="en-US" dirty="0" smtClean="0"/>
-              <a:t>Data Management Resources</a:t>
-            </a:r>
-            <a:endParaRPr lang="en-US" dirty="0"/>
-          </a:p>
-        </p:txBody>
-      </p:sp>
-      <p:sp>
-        <p:nvSpPr>
-          <p:cNvPr id="3" name="Content Placeholder 2"/>
-          <p:cNvSpPr>
-            <a:spLocks noGrp="1"/>
-          </p:cNvSpPr>
-          <p:nvPr>
-            <p:ph idx="1"/>
-          </p:nvPr>
-        </p:nvSpPr>
-        <p:spPr/>
-        <p:txBody>
-          <a:bodyPr>
-            <a:normAutofit fontScale="92500" lnSpcReduction="20000"/>
-          </a:bodyPr>
-          <a:lstStyle/>
-          <a:p>
-            <a:r>
-              <a:rPr lang="en-US" dirty="0" smtClean="0"/>
-              <a:t>Best Practices</a:t>
-            </a:r>
-          </a:p>
-          <a:p>
-            <a:pPr lvl="1"/>
-            <a:r>
-              <a:rPr lang="en-US" dirty="0" err="1" smtClean="0"/>
-              <a:t>DataONE</a:t>
-            </a:r>
-            <a:r>
-              <a:rPr lang="en-US" dirty="0" smtClean="0"/>
-              <a:t>, Best Practices Primer</a:t>
-            </a:r>
-          </a:p>
-          <a:p>
-            <a:pPr lvl="2"/>
-            <a:r>
-              <a:rPr lang="en-US" dirty="0">
-                <a:hlinkClick r:id="rId2"/>
-              </a:rPr>
-              <a:t>http://www.dataone.org/sites/all/documents/DataONE_BP_Primer_020212.</a:t>
-            </a:r>
-            <a:r>
-              <a:rPr lang="en-US" dirty="0" smtClean="0">
-                <a:hlinkClick r:id="rId2"/>
-              </a:rPr>
-              <a:t>pdf</a:t>
-            </a:r>
-            <a:r>
-              <a:rPr lang="en-US" dirty="0" smtClean="0"/>
-              <a:t> </a:t>
-            </a:r>
-          </a:p>
-          <a:p>
-            <a:pPr lvl="1"/>
-            <a:r>
-              <a:rPr lang="en-US" dirty="0"/>
-              <a:t>ESIP, Data Management Short Course for </a:t>
-            </a:r>
-            <a:r>
-              <a:rPr lang="en-US" dirty="0" smtClean="0"/>
-              <a:t>Scientists</a:t>
-            </a:r>
-          </a:p>
-          <a:p>
-            <a:pPr lvl="2"/>
-            <a:r>
-              <a:rPr lang="en-US" dirty="0">
-                <a:hlinkClick r:id="rId3"/>
-              </a:rPr>
-              <a:t>http://commons.esipfed.org/</a:t>
-            </a:r>
-            <a:r>
-              <a:rPr lang="en-US" dirty="0" smtClean="0">
-                <a:hlinkClick r:id="rId3"/>
-              </a:rPr>
-              <a:t>datamanagementshortcourse</a:t>
-            </a:r>
-            <a:r>
-              <a:rPr lang="en-US" dirty="0" smtClean="0"/>
-              <a:t> </a:t>
-            </a:r>
-          </a:p>
-          <a:p>
-            <a:r>
-              <a:rPr lang="en-US" dirty="0" smtClean="0"/>
-              <a:t>Data Management Planning</a:t>
-            </a:r>
-          </a:p>
-          <a:p>
-            <a:pPr lvl="1"/>
-            <a:r>
-              <a:rPr lang="en-US" dirty="0" err="1" smtClean="0"/>
-              <a:t>DataONE</a:t>
-            </a:r>
-            <a:r>
-              <a:rPr lang="en-US" dirty="0" smtClean="0"/>
-              <a:t>, Data Management Planning</a:t>
-            </a:r>
-          </a:p>
-          <a:p>
-            <a:pPr lvl="2"/>
-            <a:r>
-              <a:rPr lang="en-US" dirty="0">
-                <a:hlinkClick r:id="rId4"/>
-              </a:rPr>
-              <a:t>http://www.dataone.org/data-management-</a:t>
-            </a:r>
-            <a:r>
-              <a:rPr lang="en-US" dirty="0" smtClean="0">
-                <a:hlinkClick r:id="rId4"/>
-              </a:rPr>
-              <a:t>planning</a:t>
-            </a:r>
-            <a:r>
-              <a:rPr lang="en-US" dirty="0" smtClean="0"/>
-              <a:t> </a:t>
-            </a:r>
-          </a:p>
-          <a:p>
-            <a:pPr lvl="1"/>
-            <a:r>
-              <a:rPr lang="en-US" dirty="0" err="1" smtClean="0"/>
-              <a:t>DataONE</a:t>
-            </a:r>
-            <a:r>
-              <a:rPr lang="en-US" dirty="0" smtClean="0"/>
-              <a:t>, Data Management Plan Tool</a:t>
-            </a:r>
-          </a:p>
-          <a:p>
-            <a:pPr lvl="2"/>
-            <a:r>
-              <a:rPr lang="en-US" dirty="0">
-                <a:hlinkClick r:id="rId5"/>
-              </a:rPr>
-              <a:t>https://dmp.cdlib.org</a:t>
-            </a:r>
-            <a:r>
-              <a:rPr lang="en-US" dirty="0" smtClean="0">
-                <a:hlinkClick r:id="rId5"/>
-              </a:rPr>
-              <a:t>/</a:t>
-            </a:r>
-            <a:r>
-              <a:rPr lang="en-US" dirty="0" smtClean="0"/>
-              <a:t> </a:t>
-            </a:r>
-          </a:p>
-          <a:p>
-            <a:endParaRPr lang="en-US" dirty="0"/>
-          </a:p>
-        </p:txBody>
-      </p:sp>
-    </p:spTree>
-    <p:extLst>
-      <p:ext uri="{BB962C8B-B14F-4D97-AF65-F5344CB8AC3E}">
-        <p14:creationId xmlns:p14="http://schemas.microsoft.com/office/powerpoint/2010/main" val="1572327209"/>
-      </p:ext>
-    </p:extLst>
-  </p:cSld>
-  <p:clrMapOvr>
-    <a:masterClrMapping/>
-  </p:clrMapOvr>
-</p:sld>
-</file>
-
 <file path=ppt/slides/slide21.xml><?xml version="1.0" encoding="utf-8"?>
 <p:sld xmlns:a="http://schemas.openxmlformats.org/drawingml/2006/main" xmlns:r="http://schemas.openxmlformats.org/officeDocument/2006/relationships" xmlns:p="http://schemas.openxmlformats.org/presentationml/2006/main">
   <p:cSld>
@@ -9432,6 +9916,212 @@
         </p:nvSpPr>
         <p:spPr/>
         <p:txBody>
+          <a:bodyPr/>
+          <a:lstStyle/>
+          <a:p>
+            <a:r>
+              <a:rPr lang="en-US" dirty="0" smtClean="0"/>
+              <a:t>Data Management Resources</a:t>
+            </a:r>
+            <a:endParaRPr lang="en-US" dirty="0"/>
+          </a:p>
+        </p:txBody>
+      </p:sp>
+      <p:sp>
+        <p:nvSpPr>
+          <p:cNvPr id="3" name="Content Placeholder 2"/>
+          <p:cNvSpPr>
+            <a:spLocks noGrp="1"/>
+          </p:cNvSpPr>
+          <p:nvPr>
+            <p:ph idx="1"/>
+          </p:nvPr>
+        </p:nvSpPr>
+        <p:spPr/>
+        <p:txBody>
+          <a:bodyPr>
+            <a:normAutofit fontScale="92500" lnSpcReduction="20000"/>
+          </a:bodyPr>
+          <a:lstStyle/>
+          <a:p>
+            <a:r>
+              <a:rPr lang="en-US" dirty="0" smtClean="0"/>
+              <a:t>Best Practices</a:t>
+            </a:r>
+          </a:p>
+          <a:p>
+            <a:pPr lvl="1"/>
+            <a:r>
+              <a:rPr lang="en-US" dirty="0" err="1" smtClean="0"/>
+              <a:t>DataONE</a:t>
+            </a:r>
+            <a:r>
+              <a:rPr lang="en-US" dirty="0" smtClean="0"/>
+              <a:t>, Best Practices Primer</a:t>
+            </a:r>
+          </a:p>
+          <a:p>
+            <a:pPr lvl="2"/>
+            <a:r>
+              <a:rPr lang="en-US" dirty="0">
+                <a:hlinkClick r:id="rId2"/>
+              </a:rPr>
+              <a:t>http://www.dataone.org/sites/all/documents/DataONE_BP_Primer_020212.</a:t>
+            </a:r>
+            <a:r>
+              <a:rPr lang="en-US" dirty="0" smtClean="0">
+                <a:hlinkClick r:id="rId2"/>
+              </a:rPr>
+              <a:t>pdf</a:t>
+            </a:r>
+            <a:r>
+              <a:rPr lang="en-US" dirty="0" smtClean="0"/>
+              <a:t> </a:t>
+            </a:r>
+          </a:p>
+          <a:p>
+            <a:pPr lvl="1"/>
+            <a:r>
+              <a:rPr lang="en-US" dirty="0"/>
+              <a:t>ESIP, Data Management Short Course for </a:t>
+            </a:r>
+            <a:r>
+              <a:rPr lang="en-US" dirty="0" smtClean="0"/>
+              <a:t>Scientists</a:t>
+            </a:r>
+          </a:p>
+          <a:p>
+            <a:pPr lvl="2"/>
+            <a:r>
+              <a:rPr lang="en-US" dirty="0">
+                <a:hlinkClick r:id="rId3"/>
+              </a:rPr>
+              <a:t>http://commons.esipfed.org/</a:t>
+            </a:r>
+            <a:r>
+              <a:rPr lang="en-US" dirty="0" smtClean="0">
+                <a:hlinkClick r:id="rId3"/>
+              </a:rPr>
+              <a:t>datamanagementshortcourse</a:t>
+            </a:r>
+            <a:r>
+              <a:rPr lang="en-US" dirty="0" smtClean="0"/>
+              <a:t> </a:t>
+            </a:r>
+          </a:p>
+          <a:p>
+            <a:r>
+              <a:rPr lang="en-US" dirty="0" smtClean="0"/>
+              <a:t>Data Management Planning</a:t>
+            </a:r>
+          </a:p>
+          <a:p>
+            <a:pPr lvl="1"/>
+            <a:r>
+              <a:rPr lang="en-US" dirty="0" err="1" smtClean="0"/>
+              <a:t>DataONE</a:t>
+            </a:r>
+            <a:r>
+              <a:rPr lang="en-US" dirty="0" smtClean="0"/>
+              <a:t>, Data Management Planning</a:t>
+            </a:r>
+          </a:p>
+          <a:p>
+            <a:pPr lvl="2"/>
+            <a:r>
+              <a:rPr lang="en-US" dirty="0">
+                <a:hlinkClick r:id="rId4"/>
+              </a:rPr>
+              <a:t>http://www.dataone.org/data-management-</a:t>
+            </a:r>
+            <a:r>
+              <a:rPr lang="en-US" dirty="0" smtClean="0">
+                <a:hlinkClick r:id="rId4"/>
+              </a:rPr>
+              <a:t>planning</a:t>
+            </a:r>
+            <a:r>
+              <a:rPr lang="en-US" dirty="0" smtClean="0"/>
+              <a:t> </a:t>
+            </a:r>
+          </a:p>
+          <a:p>
+            <a:pPr lvl="1"/>
+            <a:r>
+              <a:rPr lang="en-US" dirty="0" err="1" smtClean="0"/>
+              <a:t>DataONE</a:t>
+            </a:r>
+            <a:r>
+              <a:rPr lang="en-US" dirty="0" smtClean="0"/>
+              <a:t>, Data Management Plan Tool</a:t>
+            </a:r>
+          </a:p>
+          <a:p>
+            <a:pPr lvl="2"/>
+            <a:r>
+              <a:rPr lang="en-US" dirty="0">
+                <a:hlinkClick r:id="rId5"/>
+              </a:rPr>
+              <a:t>https://dmp.cdlib.org</a:t>
+            </a:r>
+            <a:r>
+              <a:rPr lang="en-US" dirty="0" smtClean="0">
+                <a:hlinkClick r:id="rId5"/>
+              </a:rPr>
+              <a:t>/</a:t>
+            </a:r>
+            <a:r>
+              <a:rPr lang="en-US" dirty="0" smtClean="0"/>
+              <a:t> </a:t>
+            </a:r>
+          </a:p>
+          <a:p>
+            <a:endParaRPr lang="en-US" dirty="0"/>
+          </a:p>
+        </p:txBody>
+      </p:sp>
+    </p:spTree>
+    <p:extLst>
+      <p:ext uri="{BB962C8B-B14F-4D97-AF65-F5344CB8AC3E}">
+        <p14:creationId xmlns:p14="http://schemas.microsoft.com/office/powerpoint/2010/main" val="1572327209"/>
+      </p:ext>
+    </p:extLst>
+  </p:cSld>
+  <p:clrMapOvr>
+    <a:masterClrMapping/>
+  </p:clrMapOvr>
+</p:sld>
+</file>
+
+<file path=ppt/slides/slide22.xml><?xml version="1.0" encoding="utf-8"?>
+<p:sld xmlns:a="http://schemas.openxmlformats.org/drawingml/2006/main" xmlns:r="http://schemas.openxmlformats.org/officeDocument/2006/relationships" xmlns:p="http://schemas.openxmlformats.org/presentationml/2006/main">
+  <p:cSld>
+    <p:spTree>
+      <p:nvGrpSpPr>
+        <p:cNvPr id="1" name=""/>
+        <p:cNvGrpSpPr/>
+        <p:nvPr/>
+      </p:nvGrpSpPr>
+      <p:grpSpPr>
+        <a:xfrm>
+          <a:off x="0" y="0"/>
+          <a:ext cx="0" cy="0"/>
+          <a:chOff x="0" y="0"/>
+          <a:chExt cx="0" cy="0"/>
+        </a:xfrm>
+      </p:grpSpPr>
+      <p:sp>
+        <p:nvSpPr>
+          <p:cNvPr id="2" name="Title 1"/>
+          <p:cNvSpPr>
+            <a:spLocks noGrp="1"/>
+          </p:cNvSpPr>
+          <p:nvPr>
+            <p:ph type="title"/>
+          </p:nvPr>
+        </p:nvSpPr>
+        <p:spPr/>
+        <p:txBody>
           <a:bodyPr>
             <a:normAutofit/>
           </a:bodyPr>
@@ -9439,11 +10129,7 @@
           <a:p>
             <a:r>
               <a:rPr lang="en-US" dirty="0" smtClean="0"/>
-              <a:t>Top </a:t>
-            </a:r>
-            <a:r>
-              <a:rPr lang="en-US" dirty="0" smtClean="0"/>
-              <a:t>10 Tips for Data Management</a:t>
+              <a:t>Top 10 Tips for Data Management</a:t>
             </a:r>
             <a:endParaRPr lang="en-US" dirty="0"/>
           </a:p>
@@ -9459,10 +10145,15 @@
             <p:ph idx="1"/>
           </p:nvPr>
         </p:nvSpPr>
-        <p:spPr/>
+        <p:spPr>
+          <a:xfrm>
+            <a:off x="457200" y="1417638"/>
+            <a:ext cx="8229600" cy="5077003"/>
+          </a:xfrm>
+        </p:spPr>
         <p:txBody>
           <a:bodyPr>
-            <a:normAutofit fontScale="85000" lnSpcReduction="20000"/>
+            <a:normAutofit fontScale="92500" lnSpcReduction="20000"/>
           </a:bodyPr>
           <a:lstStyle/>
           <a:p>
@@ -9512,11 +10203,7 @@
             </a:pPr>
             <a:r>
               <a:rPr lang="en-US" dirty="0" smtClean="0"/>
-              <a:t>Make </a:t>
-            </a:r>
-            <a:r>
-              <a:rPr lang="en-US" dirty="0" smtClean="0"/>
-              <a:t>a data dictionary</a:t>
+              <a:t>Make a data dictionary</a:t>
             </a:r>
           </a:p>
           <a:p>
@@ -9526,15 +10213,7 @@
             </a:pPr>
             <a:r>
               <a:rPr lang="en-US" dirty="0" smtClean="0"/>
-              <a:t>Document </a:t>
-            </a:r>
-            <a:r>
-              <a:rPr lang="en-US" dirty="0" smtClean="0"/>
-              <a:t>as </a:t>
-            </a:r>
-            <a:r>
-              <a:rPr lang="en-US" dirty="0" smtClean="0"/>
-              <a:t>you go</a:t>
+              <a:t>Document as you go</a:t>
             </a:r>
           </a:p>
           <a:p>
@@ -9544,13 +10223,8 @@
             </a:pPr>
             <a:r>
               <a:rPr lang="en-US" dirty="0" smtClean="0"/>
-              <a:t>Back up early and often (in the cloud?</a:t>
-            </a:r>
-            <a:r>
-              <a:rPr lang="en-US" dirty="0" smtClean="0"/>
-              <a:t>)</a:t>
-            </a:r>
-            <a:endParaRPr lang="en-US" dirty="0" smtClean="0"/>
+              <a:t>Back up early and often (in the cloud?)</a:t>
+            </a:r>
           </a:p>
           <a:p>
             <a:pPr marL="514350" indent="-514350">
@@ -9559,7 +10233,11 @@
             </a:pPr>
             <a:r>
               <a:rPr lang="en-US" dirty="0" smtClean="0"/>
-              <a:t>Archive/publish your data</a:t>
+              <a:t>Address </a:t>
+            </a:r>
+            <a:r>
+              <a:rPr lang="en-US" dirty="0" smtClean="0"/>
+              <a:t>licensing/confidentiality/restricted access</a:t>
             </a:r>
           </a:p>
           <a:p>
@@ -9569,11 +10247,7 @@
             </a:pPr>
             <a:r>
               <a:rPr lang="en-US" dirty="0" smtClean="0"/>
-              <a:t>Address licensing/confidentiality/restricted </a:t>
-            </a:r>
-            <a:r>
-              <a:rPr lang="en-US" dirty="0" smtClean="0"/>
-              <a:t>access</a:t>
+              <a:t>Metadata, metadata, metadata</a:t>
             </a:r>
           </a:p>
           <a:p>
@@ -9582,16 +10256,13 @@
               <a:buAutoNum type="arabicPeriod"/>
             </a:pPr>
             <a:r>
+              <a:rPr lang="en-US" dirty="0"/>
+              <a:t>Archive/publish your </a:t>
+            </a:r>
+            <a:r>
               <a:rPr lang="en-US" dirty="0" smtClean="0"/>
-              <a:t>Metadata, metadata, metadata</a:t>
-            </a:r>
-            <a:endParaRPr lang="en-US" dirty="0" smtClean="0"/>
-          </a:p>
-          <a:p>
-            <a:pPr marL="514350" indent="-514350">
-              <a:buFont typeface="+mj-lt"/>
-              <a:buAutoNum type="arabicPeriod"/>
-            </a:pPr>
+              <a:t>data</a:t>
+            </a:r>
             <a:endParaRPr lang="en-US" dirty="0"/>
           </a:p>
         </p:txBody>
@@ -9610,6 +10281,101 @@
 </file>
 
 <file path=ppt/slides/slide3.xml><?xml version="1.0" encoding="utf-8"?>
+<p:sld xmlns:a="http://schemas.openxmlformats.org/drawingml/2006/main" xmlns:r="http://schemas.openxmlformats.org/officeDocument/2006/relationships" xmlns:p="http://schemas.openxmlformats.org/presentationml/2006/main">
+  <p:cSld>
+    <p:spTree>
+      <p:nvGrpSpPr>
+        <p:cNvPr id="1" name=""/>
+        <p:cNvGrpSpPr/>
+        <p:nvPr/>
+      </p:nvGrpSpPr>
+      <p:grpSpPr>
+        <a:xfrm>
+          <a:off x="0" y="0"/>
+          <a:ext cx="0" cy="0"/>
+          <a:chOff x="0" y="0"/>
+          <a:chExt cx="0" cy="0"/>
+        </a:xfrm>
+      </p:grpSpPr>
+      <p:sp>
+        <p:nvSpPr>
+          <p:cNvPr id="2" name="Title 1"/>
+          <p:cNvSpPr>
+            <a:spLocks noGrp="1"/>
+          </p:cNvSpPr>
+          <p:nvPr>
+            <p:ph type="title"/>
+          </p:nvPr>
+        </p:nvSpPr>
+        <p:spPr/>
+        <p:txBody>
+          <a:bodyPr/>
+          <a:lstStyle/>
+          <a:p>
+            <a:r>
+              <a:rPr lang="en-US" dirty="0" smtClean="0"/>
+              <a:t>Don’t let this happen to you…</a:t>
+            </a:r>
+            <a:endParaRPr lang="en-US" dirty="0"/>
+          </a:p>
+        </p:txBody>
+      </p:sp>
+      <p:sp>
+        <p:nvSpPr>
+          <p:cNvPr id="3" name="Content Placeholder 2"/>
+          <p:cNvSpPr>
+            <a:spLocks noGrp="1"/>
+          </p:cNvSpPr>
+          <p:nvPr>
+            <p:ph idx="1"/>
+          </p:nvPr>
+        </p:nvSpPr>
+        <p:spPr/>
+        <p:txBody>
+          <a:bodyPr/>
+          <a:lstStyle/>
+          <a:p>
+            <a:r>
+              <a:rPr lang="en-US" dirty="0">
+                <a:hlinkClick r:id="rId2"/>
+              </a:rPr>
+              <a:t>http://youtu.be/</a:t>
+            </a:r>
+            <a:r>
+              <a:rPr lang="en-US" dirty="0" smtClean="0">
+                <a:hlinkClick r:id="rId2"/>
+              </a:rPr>
+              <a:t>wU99CCWr77k</a:t>
+            </a:r>
+            <a:r>
+              <a:rPr lang="en-US" dirty="0" smtClean="0"/>
+              <a:t> </a:t>
+            </a:r>
+            <a:endParaRPr lang="en-US" dirty="0"/>
+          </a:p>
+        </p:txBody>
+      </p:sp>
+    </p:spTree>
+    <p:extLst>
+      <p:ext uri="{BB962C8B-B14F-4D97-AF65-F5344CB8AC3E}">
+        <p14:creationId xmlns:p14="http://schemas.microsoft.com/office/powerpoint/2010/main" val="2951424739"/>
+      </p:ext>
+    </p:extLst>
+  </p:cSld>
+  <p:clrMapOvr>
+    <a:masterClrMapping/>
+  </p:clrMapOvr>
+  <p:timing>
+    <p:tnLst>
+      <p:par>
+        <p:cTn xmlns:p14="http://schemas.microsoft.com/office/powerpoint/2010/main" id="1" dur="indefinite" restart="never" nodeType="tmRoot"/>
+      </p:par>
+    </p:tnLst>
+  </p:timing>
+</p:sld>
+</file>
+
+<file path=ppt/slides/slide4.xml><?xml version="1.0" encoding="utf-8"?>
 <p:sld xmlns:a="http://schemas.openxmlformats.org/drawingml/2006/main" xmlns:r="http://schemas.openxmlformats.org/officeDocument/2006/relationships" xmlns:p="http://schemas.openxmlformats.org/presentationml/2006/main">
   <p:cSld>
     <p:spTree>
@@ -10008,6 +10774,59 @@
                       </p:childTnLst>
                     </p:cTn>
                   </p:par>
+                  <p:par>
+                    <p:cTn id="18" fill="hold">
+                      <p:stCondLst>
+                        <p:cond delay="indefinite"/>
+                      </p:stCondLst>
+                      <p:childTnLst>
+                        <p:par>
+                          <p:cTn id="19" fill="hold">
+                            <p:stCondLst>
+                              <p:cond delay="0"/>
+                            </p:stCondLst>
+                            <p:childTnLst>
+                              <p:par>
+                                <p:cTn id="20" presetID="5" presetClass="entr" presetSubtype="10" fill="hold" grpId="2" nodeType="clickEffect">
+                                  <p:stCondLst>
+                                    <p:cond delay="0"/>
+                                  </p:stCondLst>
+                                  <p:childTnLst>
+                                    <p:set>
+                                      <p:cBhvr>
+                                        <p:cTn id="21" dur="1" fill="hold">
+                                          <p:stCondLst>
+                                            <p:cond delay="0"/>
+                                          </p:stCondLst>
+                                        </p:cTn>
+                                        <p:tgtEl>
+                                          <p:spTgt spid="6"/>
+                                        </p:tgtEl>
+                                        <p:attrNameLst>
+                                          <p:attrName>style.visibility</p:attrName>
+                                        </p:attrNameLst>
+                                      </p:cBhvr>
+                                      <p:to>
+                                        <p:strVal val="visible"/>
+                                      </p:to>
+                                    </p:set>
+                                    <p:animEffect transition="in" filter="checkerboard(across)">
+                                      <p:cBhvr>
+                                        <p:cTn id="22" dur="500"/>
+                                        <p:tgtEl>
+                                          <p:spTgt spid="6"/>
+                                        </p:tgtEl>
+                                      </p:cBhvr>
+                                    </p:animEffect>
+                                  </p:childTnLst>
+                                </p:cTn>
+                              </p:par>
+                            </p:childTnLst>
+                          </p:cTn>
+                        </p:par>
+                      </p:childTnLst>
+                    </p:cTn>
+                  </p:par>
                 </p:childTnLst>
               </p:cTn>
               <p:prevCondLst>
@@ -10032,13 +10851,14 @@
     <p:bldLst>
       <p:bldP spid="6" grpId="0"/>
       <p:bldP spid="6" grpId="1"/>
+      <p:bldP spid="6" grpId="2"/>
       <p:bldP spid="8" grpId="0"/>
     </p:bldLst>
   </p:timing>
 </p:sld>
 </file>
 
-<file path=ppt/slides/slide4.xml><?xml version="1.0" encoding="utf-8"?>
+<file path=ppt/slides/slide5.xml><?xml version="1.0" encoding="utf-8"?>
 <p:sld xmlns:a="http://schemas.openxmlformats.org/drawingml/2006/main" xmlns:r="http://schemas.openxmlformats.org/officeDocument/2006/relationships" xmlns:p="http://schemas.openxmlformats.org/presentationml/2006/main">
   <p:cSld>
     <p:spTree>
@@ -10164,7 +10984,7 @@
 </p:sld>
 </file>
 
-<file path=ppt/slides/slide5.xml><?xml version="1.0" encoding="utf-8"?>
+<file path=ppt/slides/slide6.xml><?xml version="1.0" encoding="utf-8"?>
 <p:sld xmlns:a="http://schemas.openxmlformats.org/drawingml/2006/main" xmlns:r="http://schemas.openxmlformats.org/officeDocument/2006/relationships" xmlns:p="http://schemas.openxmlformats.org/presentationml/2006/main">
   <p:cSld>
     <p:spTree>
@@ -10251,8 +11071,8 @@
         </p:nvSpPr>
         <p:spPr>
           <a:xfrm>
-            <a:off x="4425754" y="1673445"/>
-            <a:ext cx="4572000" cy="2862323"/>
+            <a:off x="4425754" y="1581787"/>
+            <a:ext cx="4572000" cy="2308324"/>
           </a:xfrm>
           <a:prstGeom prst="rect">
             <a:avLst/>
@@ -10265,10 +11085,9 @@
           <a:lstStyle/>
           <a:p>
             <a:r>
-              <a:rPr lang="en-US" dirty="0"/>
+              <a:rPr lang="en-US" sz="1600" dirty="0"/>
               <a:t>The detectors flown on Apollo 12, 14 and 15 operated until NASA shut them off in September 1977 due to budgetary concerns. While the detectors worked properly, NASA did not preserve the archival tapes of the data they collected. For three decades NASA assumed the dust detector data had been lost forever, until 2006 when O’Brien heard about NASA’s mistake and told them he still had a set of backup copies.</a:t>
             </a:r>
-            <a:endParaRPr lang="en-US" dirty="0"/>
           </a:p>
         </p:txBody>
       </p:sp>
@@ -10280,7 +11099,7 @@
         </p:nvSpPr>
         <p:spPr>
           <a:xfrm>
-            <a:off x="4425754" y="5942097"/>
+            <a:off x="4425754" y="6289073"/>
             <a:ext cx="4572000" cy="430887"/>
           </a:xfrm>
           <a:prstGeom prst="rect">
@@ -10310,6 +11129,137 @@
               <a:t> </a:t>
             </a:r>
             <a:endParaRPr lang="en-US" sz="1100" dirty="0"/>
+          </a:p>
+        </p:txBody>
+      </p:sp>
+      <p:sp>
+        <p:nvSpPr>
+          <p:cNvPr id="3" name="Rectangle 2"/>
+          <p:cNvSpPr/>
+          <p:nvPr/>
+        </p:nvSpPr>
+        <p:spPr>
+          <a:xfrm rot="19398648">
+            <a:off x="3814882" y="3962483"/>
+            <a:ext cx="5026511" cy="646331"/>
+          </a:xfrm>
+          <a:prstGeom prst="rect">
+            <a:avLst/>
+          </a:prstGeom>
+          <a:noFill/>
+        </p:spPr>
+        <p:txBody>
+          <a:bodyPr wrap="none" lIns="91440" tIns="45720" rIns="91440" bIns="45720">
+            <a:spAutoFit/>
+            <a:scene3d>
+              <a:camera prst="orthographicFront">
+                <a:rot lat="0" lon="0" rev="0"/>
+              </a:camera>
+              <a:lightRig rig="contrasting" dir="t">
+                <a:rot lat="0" lon="0" rev="4500000"/>
+              </a:lightRig>
+            </a:scene3d>
+            <a:sp3d contourW="6350" prstMaterial="metal">
+              <a:bevelT w="127000" h="31750" prst="relaxedInset"/>
+              <a:contourClr>
+                <a:schemeClr val="accent1">
+                  <a:shade val="75000"/>
+                </a:schemeClr>
+              </a:contourClr>
+            </a:sp3d>
+          </a:bodyPr>
+          <a:lstStyle/>
+          <a:p>
+            <a:pPr algn="ctr"/>
+            <a:r>
+              <a:rPr lang="en-US" sz="3600" b="1" cap="all" dirty="0" smtClean="0">
+                <a:ln w="0"/>
+                <a:gradFill flip="none">
+                  <a:gsLst>
+                    <a:gs pos="0">
+                      <a:schemeClr val="accent1">
+                        <a:tint val="75000"/>
+                        <a:shade val="75000"/>
+                        <a:satMod val="170000"/>
+                      </a:schemeClr>
+                    </a:gs>
+                    <a:gs pos="49000">
+                      <a:schemeClr val="accent1">
+                        <a:tint val="88000"/>
+                        <a:shade val="65000"/>
+                        <a:satMod val="172000"/>
+                      </a:schemeClr>
+                    </a:gs>
+                    <a:gs pos="50000">
+                      <a:schemeClr val="accent1">
+                        <a:shade val="65000"/>
+                        <a:satMod val="130000"/>
+                      </a:schemeClr>
+                    </a:gs>
+                    <a:gs pos="92000">
+                      <a:schemeClr val="accent1">
+                        <a:shade val="50000"/>
+                        <a:satMod val="120000"/>
+                      </a:schemeClr>
+                    </a:gs>
+                    <a:gs pos="100000">
+                      <a:schemeClr val="accent1">
+                        <a:shade val="48000"/>
+                        <a:satMod val="120000"/>
+                      </a:schemeClr>
+                    </a:gs>
+                  </a:gsLst>
+                  <a:lin ang="5400000"/>
+                </a:gradFill>
+                <a:effectLst>
+                  <a:reflection blurRad="12700" stA="50000" endPos="50000" dist="5000" dir="5400000" sy="-100000" rotWithShape="0"/>
+                </a:effectLst>
+              </a:rPr>
+              <a:t>Old Data, New Science</a:t>
+            </a:r>
+            <a:endParaRPr lang="en-US" sz="3600" b="1" cap="all" dirty="0">
+              <a:ln w="0"/>
+              <a:gradFill flip="none">
+                <a:gsLst>
+                  <a:gs pos="0">
+                    <a:schemeClr val="accent1">
+                      <a:tint val="75000"/>
+                      <a:shade val="75000"/>
+                      <a:satMod val="170000"/>
+                    </a:schemeClr>
+                  </a:gs>
+                  <a:gs pos="49000">
+                    <a:schemeClr val="accent1">
+                      <a:tint val="88000"/>
+                      <a:shade val="65000"/>
+                      <a:satMod val="172000"/>
+                    </a:schemeClr>
+                  </a:gs>
+                  <a:gs pos="50000">
+                    <a:schemeClr val="accent1">
+                      <a:shade val="65000"/>
+                      <a:satMod val="130000"/>
+                    </a:schemeClr>
+                  </a:gs>
+                  <a:gs pos="92000">
+                    <a:schemeClr val="accent1">
+                      <a:shade val="50000"/>
+                      <a:satMod val="120000"/>
+                    </a:schemeClr>
+                  </a:gs>
+                  <a:gs pos="100000">
+                    <a:schemeClr val="accent1">
+                      <a:shade val="48000"/>
+                      <a:satMod val="120000"/>
+                    </a:schemeClr>
+                  </a:gs>
+                </a:gsLst>
+                <a:lin ang="5400000"/>
+              </a:gradFill>
+              <a:effectLst>
+                <a:reflection blurRad="12700" stA="50000" endPos="50000" dist="5000" dir="5400000" sy="-100000" rotWithShape="0"/>
+              </a:effectLst>
+            </a:endParaRPr>
           </a:p>
         </p:txBody>
       </p:sp>
@@ -10326,14 +11276,93 @@
   <p:timing>
     <p:tnLst>
       <p:par>
-        <p:cTn xmlns:p14="http://schemas.microsoft.com/office/powerpoint/2010/main" id="1" dur="indefinite" restart="never" nodeType="tmRoot"/>
+        <p:cTn xmlns:p14="http://schemas.microsoft.com/office/powerpoint/2010/main" id="1" dur="indefinite" restart="never" nodeType="tmRoot">
+          <p:childTnLst>
+            <p:seq concurrent="1" nextAc="seek">
+              <p:cTn id="2" dur="indefinite" nodeType="mainSeq">
+                <p:childTnLst>
+                  <p:par>
+                    <p:cTn id="3" fill="hold">
+                      <p:stCondLst>
+                        <p:cond delay="indefinite"/>
+                      </p:stCondLst>
+                      <p:childTnLst>
+                        <p:par>
+                          <p:cTn id="4" fill="hold">
+                            <p:stCondLst>
+                              <p:cond delay="0"/>
+                            </p:stCondLst>
+                            <p:childTnLst>
+                              <p:par>
+                                <p:cTn id="5" presetID="9" presetClass="entr" presetSubtype="0" fill="hold" grpId="0" nodeType="clickEffect">
+                                  <p:stCondLst>
+                                    <p:cond delay="0"/>
+                                  </p:stCondLst>
+                                  <p:childTnLst>
+                                    <p:set>
+                                      <p:cBhvr>
+                                        <p:cTn id="6" dur="1" fill="hold">
+                                          <p:stCondLst>
+                                            <p:cond delay="0"/>
+                                          </p:stCondLst>
+                                        </p:cTn>
+                                        <p:tgtEl>
+                                          <p:spTgt spid="3"/>
+                                        </p:tgtEl>
+                                        <p:attrNameLst>
+                                          <p:attrName>style.visibility</p:attrName>
+                                        </p:attrNameLst>
+                                      </p:cBhvr>
+                                      <p:to>
+                                        <p:strVal val="visible"/>
+                                      </p:to>
+                                    </p:set>
+                                    <p:animEffect transition="in" filter="dissolve">
+                                      <p:cBhvr>
+                                        <p:cTn id="7" dur="500"/>
+                                        <p:tgtEl>
+                                          <p:spTgt spid="3"/>
+                                        </p:tgtEl>
+                                      </p:cBhvr>
+                                    </p:animEffect>
+                                  </p:childTnLst>
+                                </p:cTn>
+                              </p:par>
+                            </p:childTnLst>
+                          </p:cTn>
+                        </p:par>
+                      </p:childTnLst>
+                    </p:cTn>
+                  </p:par>
+                </p:childTnLst>
+              </p:cTn>
+              <p:prevCondLst>
+                <p:cond evt="onPrev" delay="0">
+                  <p:tgtEl>
+                    <p:sldTgt/>
+                  </p:tgtEl>
+                </p:cond>
+              </p:prevCondLst>
+              <p:nextCondLst>
+                <p:cond evt="onNext" delay="0">
+                  <p:tgtEl>
+                    <p:sldTgt/>
+                  </p:tgtEl>
+                </p:cond>
+              </p:nextCondLst>
+            </p:seq>
+          </p:childTnLst>
+        </p:cTn>
       </p:par>
     </p:tnLst>
+    <p:bldLst>
+      <p:bldP spid="3" grpId="0"/>
+    </p:bldLst>
   </p:timing>
 </p:sld>
 </file>
 
-<file path=ppt/slides/slide6.xml><?xml version="1.0" encoding="utf-8"?>
+<file path=ppt/slides/slide7.xml><?xml version="1.0" encoding="utf-8"?>
 <p:sld xmlns:a="http://schemas.openxmlformats.org/drawingml/2006/main" xmlns:r="http://schemas.openxmlformats.org/officeDocument/2006/relationships" xmlns:p="http://schemas.openxmlformats.org/presentationml/2006/main">
   <p:cSld>
     <p:spTree>
@@ -10468,7 +11497,7 @@
 </p:sld>
 </file>
 
-<file path=ppt/slides/slide7.xml><?xml version="1.0" encoding="utf-8"?>
+<file path=ppt/slides/slide8.xml><?xml version="1.0" encoding="utf-8"?>
 <p:sld xmlns:a="http://schemas.openxmlformats.org/drawingml/2006/main" xmlns:r="http://schemas.openxmlformats.org/officeDocument/2006/relationships" xmlns:p="http://schemas.openxmlformats.org/presentationml/2006/main">
   <p:cSld>
     <p:spTree>
@@ -10665,109 +11694,14 @@
   <p:clrMapOvr>
     <a:masterClrMapping/>
   </p:clrMapOvr>
-  <mc:AlternateContent xmlns:mc="http://schemas.openxmlformats.org/markup-compatibility/2006">
-    <mc:Choice xmlns:p14="http://schemas.microsoft.com/office/powerpoint/2010/main" Requires="p14">
+  <mc:AlternateContent xmlns:mc="http://schemas.openxmlformats.org/markup-compatibility/2006" xmlns:p14="http://schemas.microsoft.com/office/powerpoint/2010/main">
+    <mc:Choice Requires="p14">
       <p:transition spd="slow" p14:dur="2000"/>
     </mc:Choice>
-    <mc:Fallback>
+    <mc:Fallback xmlns="">
       <p:transition xmlns:p14="http://schemas.microsoft.com/office/powerpoint/2010/main" spd="slow"/>
     </mc:Fallback>
   </mc:AlternateContent>
-  <p:timing>
-    <p:tnLst>
-      <p:par>
-        <p:cTn xmlns:p14="http://schemas.microsoft.com/office/powerpoint/2010/main" id="1" dur="indefinite" restart="never" nodeType="tmRoot"/>
-      </p:par>
-    </p:tnLst>
-  </p:timing>
-</p:sld>
-</file>
-
-<file path=ppt/slides/slide8.xml><?xml version="1.0" encoding="utf-8"?>
-<p:sld xmlns:a="http://schemas.openxmlformats.org/drawingml/2006/main" xmlns:r="http://schemas.openxmlformats.org/officeDocument/2006/relationships" xmlns:p="http://schemas.openxmlformats.org/presentationml/2006/main">
-  <p:cSld>
-    <p:spTree>
-      <p:nvGrpSpPr>
-        <p:cNvPr id="1" name=""/>
-        <p:cNvGrpSpPr/>
-        <p:nvPr/>
-      </p:nvGrpSpPr>
-      <p:grpSpPr>
-        <a:xfrm>
-          <a:off x="0" y="0"/>
-          <a:ext cx="0" cy="0"/>
-          <a:chOff x="0" y="0"/>
-          <a:chExt cx="0" cy="0"/>
-        </a:xfrm>
-      </p:grpSpPr>
-      <p:sp>
-        <p:nvSpPr>
-          <p:cNvPr id="2" name="Title 1"/>
-          <p:cNvSpPr>
-            <a:spLocks noGrp="1"/>
-          </p:cNvSpPr>
-          <p:nvPr>
-            <p:ph type="title"/>
-          </p:nvPr>
-        </p:nvSpPr>
-        <p:spPr/>
-        <p:txBody>
-          <a:bodyPr/>
-          <a:lstStyle/>
-          <a:p>
-            <a:r>
-              <a:rPr lang="en-US" dirty="0" smtClean="0"/>
-              <a:t>10 Minutes on Group Facilitation</a:t>
-            </a:r>
-            <a:endParaRPr lang="en-US" dirty="0"/>
-          </a:p>
-        </p:txBody>
-      </p:sp>
-      <p:sp>
-        <p:nvSpPr>
-          <p:cNvPr id="3" name="Content Placeholder 2"/>
-          <p:cNvSpPr>
-            <a:spLocks noGrp="1"/>
-          </p:cNvSpPr>
-          <p:nvPr>
-            <p:ph idx="1"/>
-          </p:nvPr>
-        </p:nvSpPr>
-        <p:spPr/>
-        <p:txBody>
-          <a:bodyPr/>
-          <a:lstStyle/>
-          <a:p>
-            <a:r>
-              <a:rPr lang="en-US" dirty="0" smtClean="0"/>
-              <a:t>Turn to neighbor and come up with top 3 – 5 barriers to data management</a:t>
-            </a:r>
-          </a:p>
-          <a:p>
-            <a:r>
-              <a:rPr lang="en-US" dirty="0" smtClean="0"/>
-              <a:t>Any good data management horror stories folks care to share?</a:t>
-            </a:r>
-          </a:p>
-          <a:p>
-            <a:r>
-              <a:rPr lang="en-US" dirty="0" smtClean="0"/>
-              <a:t>Come back and compare notes</a:t>
-            </a:r>
-            <a:endParaRPr lang="en-US" dirty="0"/>
-          </a:p>
-        </p:txBody>
-      </p:sp>
-    </p:spTree>
-    <p:extLst>
-      <p:ext uri="{BB962C8B-B14F-4D97-AF65-F5344CB8AC3E}">
-        <p14:creationId xmlns:p14="http://schemas.microsoft.com/office/powerpoint/2010/main" val="1275449591"/>
-      </p:ext>
-    </p:extLst>
-  </p:cSld>
-  <p:clrMapOvr>
-    <a:masterClrMapping/>
-  </p:clrMapOvr>
   <p:timing>
     <p:tnLst>
       <p:par>
@@ -10797,336 +11731,9 @@
       </p:grpSpPr>
       <p:sp>
         <p:nvSpPr>
-          <p:cNvPr id="12290" name="Text Box 2"/>
-          <p:cNvSpPr txBox="1">
-            <a:spLocks noChangeArrowheads="1"/>
-          </p:cNvSpPr>
-          <p:nvPr/>
-        </p:nvSpPr>
-        <p:spPr bwMode="auto">
-          <a:xfrm>
-            <a:off x="8442325" y="6467475"/>
-            <a:ext cx="244475" cy="254000"/>
-          </a:xfrm>
-          <a:prstGeom prst="rect">
-            <a:avLst/>
-          </a:prstGeom>
-          <a:noFill/>
-          <a:ln>
-            <a:noFill/>
-          </a:ln>
-          <a:effectLst/>
-          <a:extLst>
-            <a:ext uri="{909E8E84-426E-40dd-AFC4-6F175D3DCCD1}">
-              <a14:hiddenFill xmlns:a14="http://schemas.microsoft.com/office/drawing/2010/main">
-                <a:solidFill>
-                  <a:srgbClr val="FFFFFF"/>
-                </a:solidFill>
-              </a14:hiddenFill>
-            </a:ext>
-            <a:ext uri="{91240B29-F687-4f45-9708-019B960494DF}">
-              <a14:hiddenLine xmlns:a14="http://schemas.microsoft.com/office/drawing/2010/main" w="12700">
-                <a:solidFill>
-                  <a:schemeClr val="tx1"/>
-                </a:solidFill>
-                <a:miter lim="800000"/>
-                <a:headEnd/>
-                <a:tailEnd/>
-              </a14:hiddenLine>
-            </a:ext>
-            <a:ext uri="{AF507438-7753-43e0-B8FC-AC1667EBCBE1}">
-              <a14:hiddenEffects xmlns:a14="http://schemas.microsoft.com/office/drawing/2010/main">
-                <a:effectLst>
-                  <a:outerShdw blurRad="63500" dist="38099" dir="2700000" algn="ctr" rotWithShape="0">
-                    <a:srgbClr val="000000">
-                      <a:alpha val="74998"/>
-                    </a:srgbClr>
-                  </a:outerShdw>
-                </a:effectLst>
-              </a14:hiddenEffects>
-            </a:ext>
-          </a:extLst>
-        </p:spPr>
-        <p:txBody>
-          <a:bodyPr wrap="none" anchor="ctr"/>
-          <a:lstStyle>
-            <a:lvl1pPr algn="l">
-              <a:defRPr sz="1200">
-                <a:solidFill>
-                  <a:schemeClr val="tx1"/>
-                </a:solidFill>
-                <a:latin typeface="Gill Sans" charset="0"/>
-                <a:ea typeface="ＭＳ Ｐゴシック" charset="0"/>
-              </a:defRPr>
-            </a:lvl1pPr>
-            <a:lvl2pPr algn="l">
-              <a:defRPr sz="1200">
-                <a:solidFill>
-                  <a:schemeClr val="tx1"/>
-                </a:solidFill>
-                <a:latin typeface="Gill Sans" charset="0"/>
-                <a:ea typeface="ＭＳ Ｐゴシック" charset="0"/>
-              </a:defRPr>
-            </a:lvl2pPr>
-            <a:lvl3pPr algn="l">
-              <a:defRPr sz="1200">
-                <a:solidFill>
-                  <a:schemeClr val="tx1"/>
-                </a:solidFill>
-                <a:latin typeface="Gill Sans" charset="0"/>
-                <a:ea typeface="ＭＳ Ｐゴシック" charset="0"/>
-              </a:defRPr>
-            </a:lvl3pPr>
-            <a:lvl4pPr algn="l">
-              <a:defRPr sz="1200">
-                <a:solidFill>
-                  <a:schemeClr val="tx1"/>
-                </a:solidFill>
-                <a:latin typeface="Gill Sans" charset="0"/>
-                <a:ea typeface="ＭＳ Ｐゴシック" charset="0"/>
-              </a:defRPr>
-            </a:lvl4pPr>
-            <a:lvl5pPr algn="l">
-              <a:defRPr sz="1200">
-                <a:solidFill>
-                  <a:schemeClr val="tx1"/>
-                </a:solidFill>
-                <a:latin typeface="Gill Sans" charset="0"/>
-                <a:ea typeface="ＭＳ Ｐゴシック" charset="0"/>
-              </a:defRPr>
-            </a:lvl5pPr>
-            <a:lvl6pPr fontAlgn="base">
-              <a:spcBef>
-                <a:spcPct val="0"/>
-              </a:spcBef>
-              <a:spcAft>
-                <a:spcPct val="0"/>
-              </a:spcAft>
-              <a:defRPr sz="1200">
-                <a:solidFill>
-                  <a:schemeClr val="tx1"/>
-                </a:solidFill>
-                <a:latin typeface="Gill Sans" charset="0"/>
-                <a:ea typeface="ＭＳ Ｐゴシック" charset="0"/>
-              </a:defRPr>
-            </a:lvl6pPr>
-            <a:lvl7pPr fontAlgn="base">
-              <a:spcBef>
-                <a:spcPct val="0"/>
-              </a:spcBef>
-              <a:spcAft>
-                <a:spcPct val="0"/>
-              </a:spcAft>
-              <a:defRPr sz="1200">
-                <a:solidFill>
-                  <a:schemeClr val="tx1"/>
-                </a:solidFill>
-                <a:latin typeface="Gill Sans" charset="0"/>
-                <a:ea typeface="ＭＳ Ｐゴシック" charset="0"/>
-              </a:defRPr>
-            </a:lvl7pPr>
-            <a:lvl8pPr fontAlgn="base">
-              <a:spcBef>
-                <a:spcPct val="0"/>
-              </a:spcBef>
-              <a:spcAft>
-                <a:spcPct val="0"/>
-              </a:spcAft>
-              <a:defRPr sz="1200">
-                <a:solidFill>
-                  <a:schemeClr val="tx1"/>
-                </a:solidFill>
-                <a:latin typeface="Gill Sans" charset="0"/>
-                <a:ea typeface="ＭＳ Ｐゴシック" charset="0"/>
-              </a:defRPr>
-            </a:lvl8pPr>
-            <a:lvl9pPr fontAlgn="base">
-              <a:spcBef>
-                <a:spcPct val="0"/>
-              </a:spcBef>
-              <a:spcAft>
-                <a:spcPct val="0"/>
-              </a:spcAft>
-              <a:defRPr sz="1200">
-                <a:solidFill>
-                  <a:schemeClr val="tx1"/>
-                </a:solidFill>
-                <a:latin typeface="Gill Sans" charset="0"/>
-                <a:ea typeface="ＭＳ Ｐゴシック" charset="0"/>
-              </a:defRPr>
-            </a:lvl9pPr>
-          </a:lstStyle>
-          <a:p>
-            <a:pPr algn="r">
-              <a:defRPr/>
-            </a:pPr>
-            <a:fld id="{397BEB46-7E19-8345-B935-EE6BB9A0BF51}" type="slidenum">
-              <a:rPr lang="en-US" smtClean="0">
-                <a:solidFill>
-                  <a:srgbClr val="878787"/>
-                </a:solidFill>
-                <a:latin typeface="Calibri" charset="0"/>
-                <a:cs typeface="Calibri" charset="0"/>
-                <a:sym typeface="Calibri" charset="0"/>
-              </a:rPr>
-              <a:pPr algn="r">
-                <a:defRPr/>
-              </a:pPr>
-              <a:t>9</a:t>
-            </a:fld>
-            <a:endParaRPr lang="en-US" smtClean="0">
-              <a:solidFill>
-                <a:srgbClr val="878787"/>
-              </a:solidFill>
-              <a:latin typeface="Calibri" charset="0"/>
-              <a:cs typeface="Calibri" charset="0"/>
-              <a:sym typeface="Calibri" charset="0"/>
-            </a:endParaRPr>
-          </a:p>
-        </p:txBody>
-      </p:sp>
-      <p:sp>
-        <p:nvSpPr>
-          <p:cNvPr id="78851" name="Rectangle 3"/>
-          <p:cNvSpPr>
-            <a:spLocks/>
-          </p:cNvSpPr>
-          <p:nvPr/>
-        </p:nvSpPr>
-        <p:spPr bwMode="auto">
-          <a:xfrm>
-            <a:off x="7004050" y="6486525"/>
-            <a:ext cx="2146300" cy="365125"/>
-          </a:xfrm>
-          <a:prstGeom prst="rect">
-            <a:avLst/>
-          </a:prstGeom>
-          <a:noFill/>
-          <a:ln>
-            <a:noFill/>
-          </a:ln>
-          <a:extLst>
-            <a:ext uri="{909E8E84-426E-40dd-AFC4-6F175D3DCCD1}">
-              <a14:hiddenFill xmlns:a14="http://schemas.microsoft.com/office/drawing/2010/main">
-                <a:solidFill>
-                  <a:srgbClr val="FFFFFF"/>
-                </a:solidFill>
-              </a14:hiddenFill>
-            </a:ext>
-            <a:ext uri="{91240B29-F687-4f45-9708-019B960494DF}">
-              <a14:hiddenLine xmlns:a14="http://schemas.microsoft.com/office/drawing/2010/main" w="12700" cap="rnd">
-                <a:solidFill>
-                  <a:schemeClr val="tx1"/>
-                </a:solidFill>
-                <a:round/>
-                <a:headEnd/>
-                <a:tailEnd/>
-              </a14:hiddenLine>
-            </a:ext>
-          </a:extLst>
-        </p:spPr>
-        <p:txBody>
-          <a:bodyPr lIns="0" tIns="0" rIns="0" bIns="0"/>
-          <a:lstStyle/>
-          <a:p>
-            <a:endParaRPr lang="en-US"/>
-          </a:p>
-        </p:txBody>
-      </p:sp>
-      <p:sp>
-        <p:nvSpPr>
-          <p:cNvPr id="78852" name="Line 4"/>
-          <p:cNvSpPr>
-            <a:spLocks noChangeShapeType="1"/>
-          </p:cNvSpPr>
-          <p:nvPr/>
-        </p:nvSpPr>
-        <p:spPr bwMode="auto">
-          <a:xfrm>
-            <a:off x="457200" y="1166813"/>
-            <a:ext cx="8229600" cy="1587"/>
-          </a:xfrm>
-          <a:prstGeom prst="line">
-            <a:avLst/>
-          </a:prstGeom>
-          <a:noFill/>
-          <a:ln w="25400">
-            <a:solidFill>
-              <a:srgbClr val="186072"/>
-            </a:solidFill>
-            <a:round/>
-            <a:headEnd/>
-            <a:tailEnd/>
-          </a:ln>
-          <a:extLst>
-            <a:ext uri="{909E8E84-426E-40dd-AFC4-6F175D3DCCD1}">
-              <a14:hiddenFill xmlns:a14="http://schemas.microsoft.com/office/drawing/2010/main">
-                <a:noFill/>
-              </a14:hiddenFill>
-            </a:ext>
-          </a:extLst>
-        </p:spPr>
-        <p:txBody>
-          <a:bodyPr lIns="0" tIns="0" rIns="0" bIns="0"/>
-          <a:lstStyle/>
-          <a:p>
-            <a:endParaRPr lang="en-US"/>
-          </a:p>
-        </p:txBody>
-      </p:sp>
-      <p:sp>
-        <p:nvSpPr>
-          <p:cNvPr id="78853" name="Rectangle 5"/>
-          <p:cNvSpPr>
-            <a:spLocks/>
-          </p:cNvSpPr>
-          <p:nvPr/>
-        </p:nvSpPr>
-        <p:spPr bwMode="auto">
-          <a:xfrm>
-            <a:off x="7004050" y="6486525"/>
-            <a:ext cx="2146300" cy="365125"/>
-          </a:xfrm>
-          <a:prstGeom prst="rect">
-            <a:avLst/>
-          </a:prstGeom>
-          <a:noFill/>
-          <a:ln>
-            <a:noFill/>
-          </a:ln>
-          <a:extLst>
-            <a:ext uri="{909E8E84-426E-40dd-AFC4-6F175D3DCCD1}">
-              <a14:hiddenFill xmlns:a14="http://schemas.microsoft.com/office/drawing/2010/main">
-                <a:solidFill>
-                  <a:srgbClr val="FFFFFF"/>
-                </a:solidFill>
-              </a14:hiddenFill>
-            </a:ext>
-            <a:ext uri="{91240B29-F687-4f45-9708-019B960494DF}">
-              <a14:hiddenLine xmlns:a14="http://schemas.microsoft.com/office/drawing/2010/main" w="12700" cap="rnd">
-                <a:solidFill>
-                  <a:schemeClr val="tx1"/>
-                </a:solidFill>
-                <a:round/>
-                <a:headEnd/>
-                <a:tailEnd/>
-              </a14:hiddenLine>
-            </a:ext>
-          </a:extLst>
-        </p:spPr>
-        <p:txBody>
-          <a:bodyPr lIns="0" tIns="0" rIns="0" bIns="0"/>
-          <a:lstStyle/>
-          <a:p>
-            <a:endParaRPr lang="en-US"/>
-          </a:p>
-        </p:txBody>
-      </p:sp>
-      <p:sp>
-        <p:nvSpPr>
-          <p:cNvPr id="12295" name="Rectangle 7"/>
-          <p:cNvSpPr>
-            <a:spLocks noGrp="1" noChangeArrowheads="1"/>
+          <p:cNvPr id="2" name="Title 1"/>
+          <p:cNvSpPr>
+            <a:spLocks noGrp="1"/>
           </p:cNvSpPr>
           <p:nvPr>
             <p:ph type="title"/>
@@ -11137,21 +11744,19 @@
           <a:bodyPr/>
           <a:lstStyle/>
           <a:p>
-            <a:pPr eaLnBrk="1" hangingPunct="1">
-              <a:defRPr/>
-            </a:pPr>
-            <a:r>
-              <a:rPr lang="en-US" smtClean="0"/>
-              <a:t>Barriers to Synthesis</a:t>
-            </a:r>
-          </a:p>
-        </p:txBody>
-      </p:sp>
-      <p:sp>
-        <p:nvSpPr>
-          <p:cNvPr id="12294" name="Rectangle 6"/>
-          <p:cNvSpPr>
-            <a:spLocks noGrp="1" noChangeArrowheads="1"/>
+            <a:r>
+              <a:rPr lang="en-US" dirty="0" smtClean="0"/>
+              <a:t>10 Minutes on Group Facilitation</a:t>
+            </a:r>
+            <a:endParaRPr lang="en-US" dirty="0"/>
+          </a:p>
+        </p:txBody>
+      </p:sp>
+      <p:sp>
+        <p:nvSpPr>
+          <p:cNvPr id="3" name="Content Placeholder 2"/>
+          <p:cNvSpPr>
+            <a:spLocks noGrp="1"/>
           </p:cNvSpPr>
           <p:nvPr>
             <p:ph idx="1"/>
@@ -11162,168 +11767,36 @@
           <a:bodyPr/>
           <a:lstStyle/>
           <a:p>
-            <a:pPr marL="419100" indent="-419100" eaLnBrk="1" hangingPunct="1">
-              <a:spcBef>
-                <a:spcPct val="0"/>
-              </a:spcBef>
-              <a:buClr>
-                <a:srgbClr val="1A435D"/>
-              </a:buClr>
-              <a:buFont typeface="Arial" charset="0"/>
-              <a:buChar char="•"/>
-              <a:defRPr/>
-            </a:pPr>
-            <a:r>
-              <a:rPr lang="en-US" sz="2400" dirty="0" smtClean="0"/>
-              <a:t>Data not preserved</a:t>
-            </a:r>
-          </a:p>
-          <a:p>
-            <a:pPr lvl="1" eaLnBrk="1" hangingPunct="1">
-              <a:defRPr/>
-            </a:pPr>
-            <a:r>
-              <a:rPr lang="en-US" sz="2000" dirty="0" smtClean="0"/>
-              <a:t>Tiny proportion of ecological data are readily available</a:t>
-            </a:r>
-          </a:p>
-          <a:p>
-            <a:pPr lvl="1" eaLnBrk="1" hangingPunct="1">
-              <a:defRPr/>
-            </a:pPr>
-            <a:endParaRPr lang="en-US" sz="2000" dirty="0" smtClean="0"/>
-          </a:p>
-          <a:p>
-            <a:pPr marL="419100" indent="-419100" eaLnBrk="1" hangingPunct="1">
-              <a:buFont typeface="Arial" charset="0"/>
-              <a:buChar char="•"/>
-              <a:defRPr/>
-            </a:pPr>
-            <a:r>
-              <a:rPr lang="en-US" sz="2400" dirty="0" smtClean="0"/>
-              <a:t>Dispersed, isolated repositories</a:t>
-            </a:r>
-          </a:p>
-          <a:p>
-            <a:pPr lvl="1" eaLnBrk="1" hangingPunct="1">
-              <a:defRPr/>
-            </a:pPr>
-            <a:r>
-              <a:rPr lang="en-US" sz="2000" dirty="0" smtClean="0"/>
-              <a:t>Each community has its own; disconnected; underutilized</a:t>
-            </a:r>
-          </a:p>
-          <a:p>
-            <a:pPr lvl="1" eaLnBrk="1" hangingPunct="1">
-              <a:defRPr/>
-            </a:pPr>
-            <a:endParaRPr lang="en-US" sz="2000" dirty="0" smtClean="0"/>
-          </a:p>
-          <a:p>
-            <a:pPr marL="419100" indent="-419100" eaLnBrk="1" hangingPunct="1">
-              <a:buClr>
-                <a:srgbClr val="1A435D"/>
-              </a:buClr>
-              <a:buFont typeface="Arial" charset="0"/>
-              <a:buChar char="•"/>
-              <a:defRPr/>
-            </a:pPr>
-            <a:r>
-              <a:rPr lang="en-US" sz="2400" dirty="0" smtClean="0"/>
-              <a:t>Lack of software interoperability</a:t>
-            </a:r>
-          </a:p>
-          <a:p>
-            <a:pPr lvl="1" eaLnBrk="1" hangingPunct="1">
-              <a:defRPr/>
-            </a:pPr>
-            <a:r>
-              <a:rPr lang="en-US" sz="2000" dirty="0" err="1" smtClean="0"/>
-              <a:t>Metacat</a:t>
-            </a:r>
-            <a:r>
-              <a:rPr lang="en-US" sz="2000" dirty="0" smtClean="0"/>
-              <a:t>, </a:t>
-            </a:r>
-            <a:r>
-              <a:rPr lang="en-US" sz="2000" dirty="0" err="1" smtClean="0"/>
-              <a:t>DSpace</a:t>
-            </a:r>
-            <a:r>
-              <a:rPr lang="en-US" sz="2000" dirty="0" smtClean="0"/>
-              <a:t>, Mercury, </a:t>
-            </a:r>
-            <a:r>
-              <a:rPr lang="en-US" sz="2000" dirty="0" err="1" smtClean="0"/>
-              <a:t>iRODS</a:t>
-            </a:r>
-            <a:r>
-              <a:rPr lang="en-US" sz="2000" dirty="0" smtClean="0"/>
-              <a:t>, </a:t>
-            </a:r>
-            <a:r>
-              <a:rPr lang="en-US" sz="2000" dirty="0" err="1" smtClean="0"/>
-              <a:t>XMCat</a:t>
-            </a:r>
-            <a:r>
-              <a:rPr lang="en-US" sz="2000" dirty="0" smtClean="0"/>
-              <a:t>, </a:t>
-            </a:r>
-            <a:r>
-              <a:rPr lang="en-US" sz="2000" dirty="0" err="1" smtClean="0"/>
-              <a:t>OPeNDAP</a:t>
-            </a:r>
-            <a:r>
-              <a:rPr lang="en-US" sz="2000" dirty="0" smtClean="0"/>
-              <a:t>, ...</a:t>
-            </a:r>
-          </a:p>
-          <a:p>
-            <a:pPr lvl="1" eaLnBrk="1" hangingPunct="1">
-              <a:defRPr/>
-            </a:pPr>
-            <a:endParaRPr lang="en-US" sz="2000" dirty="0" smtClean="0"/>
-          </a:p>
-          <a:p>
-            <a:pPr marL="419100" indent="-419100" eaLnBrk="1" hangingPunct="1">
-              <a:buFont typeface="Arial" charset="0"/>
-              <a:buChar char="•"/>
-              <a:defRPr/>
-            </a:pPr>
-            <a:r>
-              <a:rPr lang="en-US" sz="2400" dirty="0" smtClean="0"/>
-              <a:t>Heterogeneous data</a:t>
-            </a:r>
-          </a:p>
-          <a:p>
-            <a:pPr lvl="1" eaLnBrk="1" hangingPunct="1">
-              <a:defRPr/>
-            </a:pPr>
-            <a:r>
-              <a:rPr lang="en-US" sz="2000" dirty="0" smtClean="0"/>
-              <a:t>Many data formats, metadata formats, and varying semantics</a:t>
-            </a:r>
+            <a:r>
+              <a:rPr lang="en-US" dirty="0" smtClean="0"/>
+              <a:t>Turn to neighbor and come up with top 3 – 5 barriers to data management</a:t>
+            </a:r>
+          </a:p>
+          <a:p>
+            <a:r>
+              <a:rPr lang="en-US" dirty="0" smtClean="0"/>
+              <a:t>Any good data management horror stories folks care to share?</a:t>
+            </a:r>
+          </a:p>
+          <a:p>
+            <a:r>
+              <a:rPr lang="en-US" dirty="0" smtClean="0"/>
+              <a:t>Come back and compare notes</a:t>
+            </a:r>
+            <a:endParaRPr lang="en-US" dirty="0"/>
           </a:p>
         </p:txBody>
       </p:sp>
     </p:spTree>
     <p:extLst>
       <p:ext uri="{BB962C8B-B14F-4D97-AF65-F5344CB8AC3E}">
-        <p14:creationId xmlns:p14="http://schemas.microsoft.com/office/powerpoint/2010/main" val="3924811006"/>
+        <p14:creationId xmlns:p14="http://schemas.microsoft.com/office/powerpoint/2010/main" val="1275449591"/>
       </p:ext>
     </p:extLst>
   </p:cSld>
   <p:clrMapOvr>
     <a:masterClrMapping/>
   </p:clrMapOvr>
-  <mc:AlternateContent xmlns:mc="http://schemas.openxmlformats.org/markup-compatibility/2006">
-    <mc:Choice xmlns:p14="http://schemas.microsoft.com/office/powerpoint/2010/main" Requires="p14">
-      <p:transition spd="slow" p14:dur="2000"/>
-    </mc:Choice>
-    <mc:Fallback>
-      <p:transition xmlns:p14="http://schemas.microsoft.com/office/powerpoint/2010/main" spd="slow"/>
-    </mc:Fallback>
-  </mc:AlternateContent>
   <p:timing>
     <p:tnLst>
       <p:par>

</xml_diff>